<commit_message>
Prepping the introduction presentation
</commit_message>
<xml_diff>
--- a/personal/Steffi/How to presentation.pptx
+++ b/personal/Steffi/How to presentation.pptx
@@ -10,15 +10,16 @@
     <p:sldId id="258" r:id="rId4"/>
     <p:sldId id="259" r:id="rId5"/>
     <p:sldId id="260" r:id="rId6"/>
-    <p:sldId id="261" r:id="rId7"/>
-    <p:sldId id="262" r:id="rId8"/>
-    <p:sldId id="263" r:id="rId9"/>
+    <p:sldId id="270" r:id="rId7"/>
+    <p:sldId id="261" r:id="rId8"/>
+    <p:sldId id="262" r:id="rId9"/>
     <p:sldId id="264" r:id="rId10"/>
-    <p:sldId id="265" r:id="rId11"/>
-    <p:sldId id="267" r:id="rId12"/>
-    <p:sldId id="266" r:id="rId13"/>
-    <p:sldId id="268" r:id="rId14"/>
-    <p:sldId id="269" r:id="rId15"/>
+    <p:sldId id="263" r:id="rId11"/>
+    <p:sldId id="265" r:id="rId12"/>
+    <p:sldId id="267" r:id="rId13"/>
+    <p:sldId id="266" r:id="rId14"/>
+    <p:sldId id="268" r:id="rId15"/>
+    <p:sldId id="269" r:id="rId16"/>
   </p:sldIdLst>
   <p:sldSz cx="9144000" cy="6858000" type="screen4x3"/>
   <p:notesSz cx="6858000" cy="9144000"/>
@@ -301,7 +302,7 @@
           <a:p>
             <a:fld id="{132194F4-BA0B-4809-9967-1E66D3663A90}" type="datetimeFigureOut">
               <a:rPr lang="en-AU" smtClean="0"/>
-              <a:t>15/09/2016</a:t>
+              <a:t>16/09/2016</a:t>
             </a:fld>
             <a:endParaRPr lang="en-AU"/>
           </a:p>
@@ -471,7 +472,7 @@
           <a:p>
             <a:fld id="{132194F4-BA0B-4809-9967-1E66D3663A90}" type="datetimeFigureOut">
               <a:rPr lang="en-AU" smtClean="0"/>
-              <a:t>15/09/2016</a:t>
+              <a:t>16/09/2016</a:t>
             </a:fld>
             <a:endParaRPr lang="en-AU"/>
           </a:p>
@@ -651,7 +652,7 @@
           <a:p>
             <a:fld id="{132194F4-BA0B-4809-9967-1E66D3663A90}" type="datetimeFigureOut">
               <a:rPr lang="en-AU" smtClean="0"/>
-              <a:t>15/09/2016</a:t>
+              <a:t>16/09/2016</a:t>
             </a:fld>
             <a:endParaRPr lang="en-AU"/>
           </a:p>
@@ -821,7 +822,7 @@
           <a:p>
             <a:fld id="{132194F4-BA0B-4809-9967-1E66D3663A90}" type="datetimeFigureOut">
               <a:rPr lang="en-AU" smtClean="0"/>
-              <a:t>15/09/2016</a:t>
+              <a:t>16/09/2016</a:t>
             </a:fld>
             <a:endParaRPr lang="en-AU"/>
           </a:p>
@@ -1067,7 +1068,7 @@
           <a:p>
             <a:fld id="{132194F4-BA0B-4809-9967-1E66D3663A90}" type="datetimeFigureOut">
               <a:rPr lang="en-AU" smtClean="0"/>
-              <a:t>15/09/2016</a:t>
+              <a:t>16/09/2016</a:t>
             </a:fld>
             <a:endParaRPr lang="en-AU"/>
           </a:p>
@@ -1355,7 +1356,7 @@
           <a:p>
             <a:fld id="{132194F4-BA0B-4809-9967-1E66D3663A90}" type="datetimeFigureOut">
               <a:rPr lang="en-AU" smtClean="0"/>
-              <a:t>15/09/2016</a:t>
+              <a:t>16/09/2016</a:t>
             </a:fld>
             <a:endParaRPr lang="en-AU"/>
           </a:p>
@@ -1777,7 +1778,7 @@
           <a:p>
             <a:fld id="{132194F4-BA0B-4809-9967-1E66D3663A90}" type="datetimeFigureOut">
               <a:rPr lang="en-AU" smtClean="0"/>
-              <a:t>15/09/2016</a:t>
+              <a:t>16/09/2016</a:t>
             </a:fld>
             <a:endParaRPr lang="en-AU"/>
           </a:p>
@@ -1895,7 +1896,7 @@
           <a:p>
             <a:fld id="{132194F4-BA0B-4809-9967-1E66D3663A90}" type="datetimeFigureOut">
               <a:rPr lang="en-AU" smtClean="0"/>
-              <a:t>15/09/2016</a:t>
+              <a:t>16/09/2016</a:t>
             </a:fld>
             <a:endParaRPr lang="en-AU"/>
           </a:p>
@@ -1990,7 +1991,7 @@
           <a:p>
             <a:fld id="{132194F4-BA0B-4809-9967-1E66D3663A90}" type="datetimeFigureOut">
               <a:rPr lang="en-AU" smtClean="0"/>
-              <a:t>15/09/2016</a:t>
+              <a:t>16/09/2016</a:t>
             </a:fld>
             <a:endParaRPr lang="en-AU"/>
           </a:p>
@@ -2267,7 +2268,7 @@
           <a:p>
             <a:fld id="{132194F4-BA0B-4809-9967-1E66D3663A90}" type="datetimeFigureOut">
               <a:rPr lang="en-AU" smtClean="0"/>
-              <a:t>15/09/2016</a:t>
+              <a:t>16/09/2016</a:t>
             </a:fld>
             <a:endParaRPr lang="en-AU"/>
           </a:p>
@@ -2520,7 +2521,7 @@
           <a:p>
             <a:fld id="{132194F4-BA0B-4809-9967-1E66D3663A90}" type="datetimeFigureOut">
               <a:rPr lang="en-AU" smtClean="0"/>
-              <a:t>15/09/2016</a:t>
+              <a:t>16/09/2016</a:t>
             </a:fld>
             <a:endParaRPr lang="en-AU"/>
           </a:p>
@@ -2733,7 +2734,7 @@
           <a:p>
             <a:fld id="{132194F4-BA0B-4809-9967-1E66D3663A90}" type="datetimeFigureOut">
               <a:rPr lang="en-AU" smtClean="0"/>
-              <a:t>15/09/2016</a:t>
+              <a:t>16/09/2016</a:t>
             </a:fld>
             <a:endParaRPr lang="en-AU"/>
           </a:p>
@@ -3131,8 +3132,8 @@
         </p:blipFill>
         <p:spPr bwMode="auto">
           <a:xfrm>
-            <a:off x="-12333" y="2857498"/>
-            <a:ext cx="9144000" cy="4000501"/>
+            <a:off x="-36513" y="2852936"/>
+            <a:ext cx="9319015" cy="4077070"/>
           </a:xfrm>
           <a:prstGeom prst="rect">
             <a:avLst/>
@@ -3251,7 +3252,73 @@
       </p:grpSpPr>
       <p:sp>
         <p:nvSpPr>
-          <p:cNvPr id="2" name="Title 1"/>
+          <p:cNvPr id="3" name="Content Placeholder 2"/>
+          <p:cNvSpPr>
+            <a:spLocks noGrp="1"/>
+          </p:cNvSpPr>
+          <p:nvPr>
+            <p:ph idx="1"/>
+          </p:nvPr>
+        </p:nvSpPr>
+        <p:spPr/>
+        <p:txBody>
+          <a:bodyPr>
+            <a:normAutofit/>
+          </a:bodyPr>
+          <a:lstStyle/>
+          <a:p>
+            <a:r>
+              <a:rPr lang="en-AU" sz="2400" dirty="0" err="1" smtClean="0"/>
+              <a:t>Jupyter</a:t>
+            </a:r>
+            <a:endParaRPr lang="en-AU" sz="2400" dirty="0"/>
+          </a:p>
+        </p:txBody>
+      </p:sp>
+      <p:pic>
+        <p:nvPicPr>
+          <p:cNvPr id="4" name="Picture 4" descr="https://ipython.org/_static/IPy_header.png"/>
+          <p:cNvPicPr>
+            <a:picLocks noChangeAspect="1" noChangeArrowheads="1"/>
+          </p:cNvPicPr>
+          <p:nvPr/>
+        </p:nvPicPr>
+        <p:blipFill>
+          <a:blip r:embed="rId2">
+            <a:extLst>
+              <a:ext uri="{28A0092B-C50C-407E-A947-70E740481C1C}">
+                <a14:useLocalDpi xmlns:a14="http://schemas.microsoft.com/office/drawing/2010/main" val="0"/>
+              </a:ext>
+            </a:extLst>
+          </a:blip>
+          <a:srcRect/>
+          <a:stretch>
+            <a:fillRect/>
+          </a:stretch>
+        </p:blipFill>
+        <p:spPr bwMode="auto">
+          <a:xfrm>
+            <a:off x="611560" y="476672"/>
+            <a:ext cx="4953000" cy="638175"/>
+          </a:xfrm>
+          <a:prstGeom prst="rect">
+            <a:avLst/>
+          </a:prstGeom>
+          <a:noFill/>
+          <a:extLst>
+            <a:ext uri="{909E8E84-426E-40DD-AFC4-6F175D3DCCD1}">
+              <a14:hiddenFill xmlns:a14="http://schemas.microsoft.com/office/drawing/2010/main">
+                <a:solidFill>
+                  <a:srgbClr val="FFFFFF"/>
+                </a:solidFill>
+              </a14:hiddenFill>
+            </a:ext>
+          </a:extLst>
+        </p:spPr>
+      </p:pic>
+      <p:sp>
+        <p:nvSpPr>
+          <p:cNvPr id="5" name="Title 1"/>
           <p:cNvSpPr>
             <a:spLocks noGrp="1"/>
           </p:cNvSpPr>
@@ -3259,52 +3326,190 @@
             <p:ph type="title"/>
           </p:nvPr>
         </p:nvSpPr>
-        <p:spPr/>
+        <p:spPr>
+          <a:xfrm>
+            <a:off x="5564560" y="274638"/>
+            <a:ext cx="3122240" cy="1143000"/>
+          </a:xfrm>
+        </p:spPr>
         <p:txBody>
           <a:bodyPr/>
           <a:lstStyle/>
           <a:p>
             <a:r>
               <a:rPr lang="en-AU" dirty="0" smtClean="0"/>
-              <a:t>Real time measurement</a:t>
+              <a:t>Notebook</a:t>
             </a:r>
             <a:endParaRPr lang="en-AU" dirty="0"/>
           </a:p>
         </p:txBody>
       </p:sp>
-      <p:sp>
-        <p:nvSpPr>
-          <p:cNvPr id="3" name="Content Placeholder 2"/>
-          <p:cNvSpPr>
-            <a:spLocks noGrp="1"/>
-          </p:cNvSpPr>
-          <p:nvPr>
-            <p:ph idx="1"/>
-          </p:nvPr>
-        </p:nvSpPr>
-        <p:spPr/>
-        <p:txBody>
-          <a:bodyPr/>
-          <a:lstStyle/>
-          <a:p>
-            <a:r>
-              <a:rPr lang="en-AU" dirty="0" smtClean="0">
-                <a:hlinkClick r:id="rId2"/>
-              </a:rPr>
-              <a:t>http://129.94.115.27:8889/</a:t>
-            </a:r>
-            <a:r>
-              <a:rPr lang="en-AU" dirty="0" smtClean="0"/>
-              <a:t> </a:t>
-            </a:r>
-            <a:endParaRPr lang="en-AU" dirty="0"/>
-          </a:p>
-        </p:txBody>
-      </p:sp>
+      <p:pic>
+        <p:nvPicPr>
+          <p:cNvPr id="3074" name="Picture 2"/>
+          <p:cNvPicPr>
+            <a:picLocks noChangeAspect="1" noChangeArrowheads="1"/>
+          </p:cNvPicPr>
+          <p:nvPr/>
+        </p:nvPicPr>
+        <p:blipFill>
+          <a:blip r:embed="rId3">
+            <a:extLst>
+              <a:ext uri="{28A0092B-C50C-407E-A947-70E740481C1C}">
+                <a14:useLocalDpi xmlns:a14="http://schemas.microsoft.com/office/drawing/2010/main" val="0"/>
+              </a:ext>
+            </a:extLst>
+          </a:blip>
+          <a:srcRect/>
+          <a:stretch>
+            <a:fillRect/>
+          </a:stretch>
+        </p:blipFill>
+        <p:spPr bwMode="auto">
+          <a:xfrm>
+            <a:off x="755576" y="2132856"/>
+            <a:ext cx="2238375" cy="619125"/>
+          </a:xfrm>
+          <a:prstGeom prst="rect">
+            <a:avLst/>
+          </a:prstGeom>
+          <a:noFill/>
+          <a:ln>
+            <a:noFill/>
+          </a:ln>
+          <a:extLst>
+            <a:ext uri="{909E8E84-426E-40DD-AFC4-6F175D3DCCD1}">
+              <a14:hiddenFill xmlns:a14="http://schemas.microsoft.com/office/drawing/2010/main">
+                <a:solidFill>
+                  <a:schemeClr val="accent1"/>
+                </a:solidFill>
+              </a14:hiddenFill>
+            </a:ext>
+            <a:ext uri="{91240B29-F687-4F45-9708-019B960494DF}">
+              <a14:hiddenLine xmlns:a14="http://schemas.microsoft.com/office/drawing/2010/main" w="9525">
+                <a:solidFill>
+                  <a:schemeClr val="tx1"/>
+                </a:solidFill>
+                <a:miter lim="800000"/>
+                <a:headEnd/>
+                <a:tailEnd/>
+              </a14:hiddenLine>
+            </a:ext>
+          </a:extLst>
+        </p:spPr>
+      </p:pic>
+      <p:pic>
+        <p:nvPicPr>
+          <p:cNvPr id="3076" name="Picture 4"/>
+          <p:cNvPicPr>
+            <a:picLocks noChangeAspect="1" noChangeArrowheads="1"/>
+          </p:cNvPicPr>
+          <p:nvPr/>
+        </p:nvPicPr>
+        <p:blipFill>
+          <a:blip r:embed="rId4">
+            <a:extLst>
+              <a:ext uri="{28A0092B-C50C-407E-A947-70E740481C1C}">
+                <a14:useLocalDpi xmlns:a14="http://schemas.microsoft.com/office/drawing/2010/main" val="0"/>
+              </a:ext>
+            </a:extLst>
+          </a:blip>
+          <a:srcRect/>
+          <a:stretch>
+            <a:fillRect/>
+          </a:stretch>
+        </p:blipFill>
+        <p:spPr bwMode="auto">
+          <a:xfrm>
+            <a:off x="692018" y="3212976"/>
+            <a:ext cx="5510956" cy="3150897"/>
+          </a:xfrm>
+          <a:prstGeom prst="rect">
+            <a:avLst/>
+          </a:prstGeom>
+          <a:noFill/>
+          <a:ln>
+            <a:noFill/>
+          </a:ln>
+          <a:extLst>
+            <a:ext uri="{909E8E84-426E-40DD-AFC4-6F175D3DCCD1}">
+              <a14:hiddenFill xmlns:a14="http://schemas.microsoft.com/office/drawing/2010/main">
+                <a:solidFill>
+                  <a:schemeClr val="accent1"/>
+                </a:solidFill>
+              </a14:hiddenFill>
+            </a:ext>
+            <a:ext uri="{91240B29-F687-4F45-9708-019B960494DF}">
+              <a14:hiddenLine xmlns:a14="http://schemas.microsoft.com/office/drawing/2010/main" w="9525">
+                <a:solidFill>
+                  <a:schemeClr val="tx1"/>
+                </a:solidFill>
+                <a:miter lim="800000"/>
+                <a:headEnd/>
+                <a:tailEnd/>
+              </a14:hiddenLine>
+            </a:ext>
+          </a:extLst>
+        </p:spPr>
+      </p:pic>
+      <p:pic>
+        <p:nvPicPr>
+          <p:cNvPr id="3075" name="Picture 3"/>
+          <p:cNvPicPr>
+            <a:picLocks noChangeAspect="1" noChangeArrowheads="1"/>
+          </p:cNvPicPr>
+          <p:nvPr/>
+        </p:nvPicPr>
+        <p:blipFill>
+          <a:blip r:embed="rId5">
+            <a:extLst>
+              <a:ext uri="{28A0092B-C50C-407E-A947-70E740481C1C}">
+                <a14:useLocalDpi xmlns:a14="http://schemas.microsoft.com/office/drawing/2010/main" val="0"/>
+              </a:ext>
+            </a:extLst>
+          </a:blip>
+          <a:srcRect/>
+          <a:stretch>
+            <a:fillRect/>
+          </a:stretch>
+        </p:blipFill>
+        <p:spPr bwMode="auto">
+          <a:xfrm>
+            <a:off x="5000890" y="1772816"/>
+            <a:ext cx="3063252" cy="2464822"/>
+          </a:xfrm>
+          <a:prstGeom prst="rect">
+            <a:avLst/>
+          </a:prstGeom>
+          <a:noFill/>
+          <a:ln>
+            <a:noFill/>
+          </a:ln>
+          <a:extLst>
+            <a:ext uri="{909E8E84-426E-40DD-AFC4-6F175D3DCCD1}">
+              <a14:hiddenFill xmlns:a14="http://schemas.microsoft.com/office/drawing/2010/main">
+                <a:solidFill>
+                  <a:schemeClr val="accent1"/>
+                </a:solidFill>
+              </a14:hiddenFill>
+            </a:ext>
+            <a:ext uri="{91240B29-F687-4F45-9708-019B960494DF}">
+              <a14:hiddenLine xmlns:a14="http://schemas.microsoft.com/office/drawing/2010/main" w="9525">
+                <a:solidFill>
+                  <a:schemeClr val="tx1"/>
+                </a:solidFill>
+                <a:miter lim="800000"/>
+                <a:headEnd/>
+                <a:tailEnd/>
+              </a14:hiddenLine>
+            </a:ext>
+          </a:extLst>
+        </p:spPr>
+      </p:pic>
     </p:spTree>
     <p:extLst>
       <p:ext uri="{BB962C8B-B14F-4D97-AF65-F5344CB8AC3E}">
-        <p14:creationId xmlns:p14="http://schemas.microsoft.com/office/powerpoint/2010/main" val="3506849739"/>
+        <p14:creationId xmlns:p14="http://schemas.microsoft.com/office/powerpoint/2010/main" val="2198001099"/>
       </p:ext>
     </p:extLst>
   </p:cSld>
@@ -3355,28 +3560,126 @@
           <a:p>
             <a:r>
               <a:rPr lang="en-AU" dirty="0" smtClean="0"/>
+              <a:t>Real time measurement</a:t>
+            </a:r>
+            <a:endParaRPr lang="en-AU" dirty="0"/>
+          </a:p>
+        </p:txBody>
+      </p:sp>
+      <p:sp>
+        <p:nvSpPr>
+          <p:cNvPr id="3" name="Content Placeholder 2"/>
+          <p:cNvSpPr>
+            <a:spLocks noGrp="1"/>
+          </p:cNvSpPr>
+          <p:nvPr>
+            <p:ph idx="1"/>
+          </p:nvPr>
+        </p:nvSpPr>
+        <p:spPr/>
+        <p:txBody>
+          <a:bodyPr>
+            <a:normAutofit/>
+          </a:bodyPr>
+          <a:lstStyle/>
+          <a:p>
+            <a:r>
+              <a:rPr lang="en-AU" sz="2400" dirty="0" smtClean="0"/>
+              <a:t>Hosted on server</a:t>
+            </a:r>
+            <a:br>
+              <a:rPr lang="en-AU" sz="2400" dirty="0" smtClean="0"/>
+            </a:br>
+            <a:r>
+              <a:rPr lang="en-AU" sz="2400" dirty="0" smtClean="0"/>
+              <a:t>accessible with </a:t>
+            </a:r>
+            <a:r>
+              <a:rPr lang="en-AU" sz="2400" dirty="0" err="1" smtClean="0"/>
+              <a:t>vpn</a:t>
+            </a:r>
+            <a:r>
+              <a:rPr lang="en-AU" sz="2400" dirty="0" smtClean="0"/>
+              <a:t> connection from everywhere</a:t>
+            </a:r>
+          </a:p>
+          <a:p>
+            <a:r>
+              <a:rPr lang="en-AU" sz="2400" dirty="0">
+                <a:hlinkClick r:id="rId2"/>
+              </a:rPr>
+              <a:t>http://129.94.115.27:8889/</a:t>
+            </a:r>
+            <a:r>
+              <a:rPr lang="en-AU" sz="2400" dirty="0"/>
+              <a:t> </a:t>
+            </a:r>
+          </a:p>
+          <a:p>
+            <a:pPr marL="0" indent="0">
+              <a:buNone/>
+            </a:pPr>
+            <a:endParaRPr lang="en-AU" sz="2400" dirty="0"/>
+          </a:p>
+        </p:txBody>
+      </p:sp>
+    </p:spTree>
+    <p:extLst>
+      <p:ext uri="{BB962C8B-B14F-4D97-AF65-F5344CB8AC3E}">
+        <p14:creationId xmlns:p14="http://schemas.microsoft.com/office/powerpoint/2010/main" val="3506849739"/>
+      </p:ext>
+    </p:extLst>
+  </p:cSld>
+  <p:clrMapOvr>
+    <a:masterClrMapping/>
+  </p:clrMapOvr>
+  <p:timing>
+    <p:tnLst>
+      <p:par>
+        <p:cTn id="1" dur="indefinite" restart="never" nodeType="tmRoot"/>
+      </p:par>
+    </p:tnLst>
+  </p:timing>
+</p:sld>
+</file>
+
+<file path=ppt/slides/slide12.xml><?xml version="1.0" encoding="utf-8"?>
+<p:sld xmlns:a="http://schemas.openxmlformats.org/drawingml/2006/main" xmlns:r="http://schemas.openxmlformats.org/officeDocument/2006/relationships" xmlns:p="http://schemas.openxmlformats.org/presentationml/2006/main">
+  <p:cSld>
+    <p:spTree>
+      <p:nvGrpSpPr>
+        <p:cNvPr id="1" name=""/>
+        <p:cNvGrpSpPr/>
+        <p:nvPr/>
+      </p:nvGrpSpPr>
+      <p:grpSpPr>
+        <a:xfrm>
+          <a:off x="0" y="0"/>
+          <a:ext cx="0" cy="0"/>
+          <a:chOff x="0" y="0"/>
+          <a:chExt cx="0" cy="0"/>
+        </a:xfrm>
+      </p:grpSpPr>
+      <p:sp>
+        <p:nvSpPr>
+          <p:cNvPr id="2" name="Title 1"/>
+          <p:cNvSpPr>
+            <a:spLocks noGrp="1"/>
+          </p:cNvSpPr>
+          <p:nvPr>
+            <p:ph type="title"/>
+          </p:nvPr>
+        </p:nvSpPr>
+        <p:spPr/>
+        <p:txBody>
+          <a:bodyPr/>
+          <a:lstStyle/>
+          <a:p>
+            <a:r>
+              <a:rPr lang="en-AU" dirty="0" smtClean="0"/>
               <a:t>Installation</a:t>
             </a:r>
             <a:endParaRPr lang="en-AU" dirty="0"/>
-          </a:p>
-        </p:txBody>
-      </p:sp>
-      <p:sp>
-        <p:nvSpPr>
-          <p:cNvPr id="3" name="Content Placeholder 2"/>
-          <p:cNvSpPr>
-            <a:spLocks noGrp="1"/>
-          </p:cNvSpPr>
-          <p:nvPr>
-            <p:ph idx="1"/>
-          </p:nvPr>
-        </p:nvSpPr>
-        <p:spPr/>
-        <p:txBody>
-          <a:bodyPr/>
-          <a:lstStyle/>
-          <a:p>
-            <a:endParaRPr lang="en-AU"/>
           </a:p>
         </p:txBody>
       </p:sp>
@@ -3389,7 +3692,7 @@
           <p:nvPr/>
         </p:nvPicPr>
         <p:blipFill>
-          <a:blip r:embed="rId2">
+          <a:blip r:embed="rId2" cstate="print">
             <a:extLst>
               <a:ext uri="{28A0092B-C50C-407E-A947-70E740481C1C}">
                 <a14:useLocalDpi xmlns:a14="http://schemas.microsoft.com/office/drawing/2010/main" val="0"/>
@@ -3403,8 +3706,8 @@
         </p:blipFill>
         <p:spPr bwMode="auto">
           <a:xfrm>
-            <a:off x="251520" y="1268760"/>
-            <a:ext cx="3672408" cy="2446742"/>
+            <a:off x="395536" y="1526203"/>
+            <a:ext cx="2664296" cy="1775087"/>
           </a:xfrm>
           <a:prstGeom prst="rect">
             <a:avLst/>
@@ -3417,6 +3720,114 @@
                   <a:srgbClr val="FFFFFF"/>
                 </a:solidFill>
               </a14:hiddenFill>
+            </a:ext>
+          </a:extLst>
+        </p:spPr>
+      </p:pic>
+      <p:sp>
+        <p:nvSpPr>
+          <p:cNvPr id="4" name="Content Placeholder 3"/>
+          <p:cNvSpPr>
+            <a:spLocks noGrp="1"/>
+          </p:cNvSpPr>
+          <p:nvPr>
+            <p:ph idx="1"/>
+          </p:nvPr>
+        </p:nvSpPr>
+        <p:spPr>
+          <a:xfrm>
+            <a:off x="179512" y="3645024"/>
+            <a:ext cx="3025986" cy="2284505"/>
+          </a:xfrm>
+        </p:spPr>
+        <p:txBody>
+          <a:bodyPr>
+            <a:normAutofit lnSpcReduction="10000"/>
+          </a:bodyPr>
+          <a:lstStyle/>
+          <a:p>
+            <a:r>
+              <a:rPr lang="en-AU" sz="2400" dirty="0" smtClean="0"/>
+              <a:t>Description on the </a:t>
+            </a:r>
+            <a:r>
+              <a:rPr lang="en-AU" sz="2400" dirty="0" err="1" smtClean="0"/>
+              <a:t>github</a:t>
+            </a:r>
+            <a:r>
+              <a:rPr lang="en-AU" sz="2400" dirty="0"/>
+              <a:t> page (</a:t>
+            </a:r>
+            <a:r>
+              <a:rPr lang="en-AU" sz="2400" dirty="0">
+                <a:hlinkClick r:id="rId3"/>
+              </a:rPr>
+              <a:t>https://</a:t>
+            </a:r>
+            <a:r>
+              <a:rPr lang="en-AU" sz="2400" dirty="0" smtClean="0">
+                <a:hlinkClick r:id="rId3"/>
+              </a:rPr>
+              <a:t>github.com/nulinspiratie/SilQ</a:t>
+            </a:r>
+            <a:r>
+              <a:rPr lang="en-AU" sz="2400" dirty="0" smtClean="0"/>
+              <a:t>)  and Readme.md document</a:t>
+            </a:r>
+            <a:endParaRPr lang="en-AU" sz="2400" dirty="0"/>
+          </a:p>
+        </p:txBody>
+      </p:sp>
+      <p:pic>
+        <p:nvPicPr>
+          <p:cNvPr id="5122" name="Picture 2"/>
+          <p:cNvPicPr>
+            <a:picLocks noChangeAspect="1" noChangeArrowheads="1"/>
+          </p:cNvPicPr>
+          <p:nvPr/>
+        </p:nvPicPr>
+        <p:blipFill>
+          <a:blip r:embed="rId4">
+            <a:extLst>
+              <a:ext uri="{28A0092B-C50C-407E-A947-70E740481C1C}">
+                <a14:useLocalDpi xmlns:a14="http://schemas.microsoft.com/office/drawing/2010/main" val="0"/>
+              </a:ext>
+            </a:extLst>
+          </a:blip>
+          <a:srcRect/>
+          <a:stretch>
+            <a:fillRect/>
+          </a:stretch>
+        </p:blipFill>
+        <p:spPr bwMode="auto">
+          <a:xfrm>
+            <a:off x="3347864" y="1484784"/>
+            <a:ext cx="5599732" cy="5121778"/>
+          </a:xfrm>
+          <a:prstGeom prst="rect">
+            <a:avLst/>
+          </a:prstGeom>
+          <a:noFill/>
+          <a:ln>
+            <a:noFill/>
+          </a:ln>
+          <a:extLst>
+            <a:ext uri="{909E8E84-426E-40DD-AFC4-6F175D3DCCD1}">
+              <a14:hiddenFill xmlns:a14="http://schemas.microsoft.com/office/drawing/2010/main">
+                <a:solidFill>
+                  <a:schemeClr val="accent1"/>
+                </a:solidFill>
+              </a14:hiddenFill>
+            </a:ext>
+            <a:ext uri="{91240B29-F687-4F45-9708-019B960494DF}">
+              <a14:hiddenLine xmlns:a14="http://schemas.microsoft.com/office/drawing/2010/main" w="9525">
+                <a:solidFill>
+                  <a:schemeClr val="tx1"/>
+                </a:solidFill>
+                <a:miter lim="800000"/>
+                <a:headEnd/>
+                <a:tailEnd/>
+              </a14:hiddenLine>
             </a:ext>
           </a:extLst>
         </p:spPr>
@@ -3441,7 +3852,7 @@
 </p:sld>
 </file>
 
-<file path=ppt/slides/slide12.xml><?xml version="1.0" encoding="utf-8"?>
+<file path=ppt/slides/slide13.xml><?xml version="1.0" encoding="utf-8"?>
 <p:sld xmlns:a="http://schemas.openxmlformats.org/drawingml/2006/main" xmlns:r="http://schemas.openxmlformats.org/officeDocument/2006/relationships" xmlns:p="http://schemas.openxmlformats.org/presentationml/2006/main">
   <p:cSld>
     <p:spTree>
@@ -3643,7 +4054,7 @@
 </p:sld>
 </file>
 
-<file path=ppt/slides/slide13.xml><?xml version="1.0" encoding="utf-8"?>
+<file path=ppt/slides/slide14.xml><?xml version="1.0" encoding="utf-8"?>
 <p:sld xmlns:a="http://schemas.openxmlformats.org/drawingml/2006/main" xmlns:r="http://schemas.openxmlformats.org/officeDocument/2006/relationships" xmlns:p="http://schemas.openxmlformats.org/presentationml/2006/main">
   <p:cSld>
     <p:spTree>
@@ -3706,7 +4117,7 @@
         </p:spPr>
         <p:txBody>
           <a:bodyPr>
-            <a:normAutofit fontScale="62500" lnSpcReduction="20000"/>
+            <a:normAutofit fontScale="85000" lnSpcReduction="20000"/>
           </a:bodyPr>
           <a:lstStyle/>
           <a:p>
@@ -3714,9 +4125,49 @@
               <a:buNone/>
             </a:pPr>
             <a:r>
-              <a:rPr lang="en-AU" sz="2000" dirty="0" smtClean="0"/>
+              <a:rPr lang="en-AU" sz="2200" b="1" dirty="0" smtClean="0">
+                <a:solidFill>
+                  <a:schemeClr val="tx2"/>
+                </a:solidFill>
+              </a:rPr>
               <a:t>Python</a:t>
             </a:r>
+          </a:p>
+          <a:p>
+            <a:pPr marL="0" indent="0">
+              <a:buNone/>
+            </a:pPr>
+            <a:r>
+              <a:rPr lang="en-AU" sz="2200" b="1" dirty="0">
+                <a:solidFill>
+                  <a:schemeClr val="tx2"/>
+                </a:solidFill>
+                <a:hlinkClick r:id="rId2"/>
+              </a:rPr>
+              <a:t>https://www.python.org/dev/peps/pep-0008/#</a:t>
+            </a:r>
+            <a:r>
+              <a:rPr lang="en-AU" sz="2200" b="1" dirty="0" smtClean="0">
+                <a:solidFill>
+                  <a:schemeClr val="tx2"/>
+                </a:solidFill>
+                <a:hlinkClick r:id="rId2"/>
+              </a:rPr>
+              <a:t>prescriptive-naming-conventions</a:t>
+            </a:r>
+            <a:r>
+              <a:rPr lang="en-AU" sz="2200" b="1" dirty="0" smtClean="0">
+                <a:solidFill>
+                  <a:schemeClr val="tx2"/>
+                </a:solidFill>
+              </a:rPr>
+              <a:t> </a:t>
+            </a:r>
+            <a:endParaRPr lang="en-AU" sz="2200" b="1" dirty="0" smtClean="0">
+              <a:solidFill>
+                <a:schemeClr val="tx2"/>
+              </a:solidFill>
+            </a:endParaRPr>
           </a:p>
           <a:p>
             <a:r>
@@ -3729,84 +4180,34 @@
             </a:r>
             <a:r>
               <a:rPr lang="en-AU" sz="2000" dirty="0" smtClean="0"/>
-              <a:t>level (use tabs)</a:t>
-            </a:r>
-          </a:p>
-          <a:p>
+              <a:t>level (use tabs</a:t>
+            </a:r>
+            <a:r>
+              <a:rPr lang="en-AU" sz="2000" dirty="0" smtClean="0"/>
+              <a:t>) </a:t>
+            </a:r>
             <a:endParaRPr lang="en-AU" sz="2000" dirty="0"/>
           </a:p>
           <a:p>
+            <a:r>
+              <a:rPr lang="en-AU" sz="2000" dirty="0" smtClean="0"/>
+              <a:t>imports on </a:t>
+            </a:r>
+            <a:r>
+              <a:rPr lang="en-AU" sz="2000" dirty="0" smtClean="0"/>
+              <a:t>top of the file </a:t>
+            </a:r>
+            <a:endParaRPr lang="en-AU" sz="2000" dirty="0"/>
+          </a:p>
+          <a:p>
             <a:pPr fontAlgn="base"/>
             <a:r>
+              <a:rPr lang="en-AU" sz="2000" dirty="0" smtClean="0"/>
+              <a:t>Class </a:t>
+            </a:r>
+            <a:r>
               <a:rPr lang="en-AU" sz="2000" dirty="0"/>
-              <a:t>Surround top-level function and class definitions with two blank </a:t>
-            </a:r>
-            <a:r>
-              <a:rPr lang="en-AU" sz="2000" dirty="0" smtClean="0"/>
-              <a:t>lines</a:t>
-            </a:r>
-            <a:br>
-              <a:rPr lang="en-AU" sz="2000" dirty="0" smtClean="0"/>
-            </a:br>
-            <a:r>
-              <a:rPr lang="en-AU" sz="2000" dirty="0" smtClean="0"/>
-              <a:t>Method </a:t>
-            </a:r>
-            <a:r>
-              <a:rPr lang="en-AU" sz="2000" dirty="0"/>
-              <a:t>definitions inside a class are surrounded by a single blank line</a:t>
-            </a:r>
-            <a:r>
-              <a:rPr lang="en-AU" sz="2000" dirty="0" smtClean="0"/>
-              <a:t>.</a:t>
-            </a:r>
-          </a:p>
-          <a:p>
-            <a:pPr fontAlgn="base"/>
-            <a:r>
-              <a:rPr lang="en-AU" sz="2000" dirty="0" smtClean="0"/>
-              <a:t>imports </a:t>
-            </a:r>
-            <a:r>
-              <a:rPr lang="en-AU" sz="2000" dirty="0"/>
-              <a:t>should usually be on separate </a:t>
-            </a:r>
-            <a:r>
-              <a:rPr lang="en-AU" sz="2000" dirty="0" smtClean="0"/>
-              <a:t>lines, on top of the file and absolute</a:t>
-            </a:r>
-            <a:br>
-              <a:rPr lang="en-AU" sz="2000" dirty="0" smtClean="0"/>
-            </a:br>
-            <a:r>
-              <a:rPr lang="en-AU" sz="2000" dirty="0" smtClean="0"/>
-              <a:t>from </a:t>
-            </a:r>
-            <a:r>
-              <a:rPr lang="en-AU" sz="2000" dirty="0" err="1" smtClean="0"/>
-              <a:t>mypkg</a:t>
-            </a:r>
-            <a:r>
-              <a:rPr lang="en-AU" sz="2000" dirty="0" smtClean="0"/>
-              <a:t> import sibling</a:t>
-            </a:r>
-          </a:p>
-          <a:p>
-            <a:pPr fontAlgn="base"/>
-            <a:r>
-              <a:rPr lang="en-AU" sz="2000" dirty="0"/>
-              <a:t>Modules should have short, all-lowercase names. Underscores can be used in the module name if it improves readability. Python packages should also have short, all-lowercase names, although the use of underscores is </a:t>
-            </a:r>
-            <a:r>
-              <a:rPr lang="en-AU" sz="2000" dirty="0" smtClean="0"/>
-              <a:t>discouraged</a:t>
-            </a:r>
-          </a:p>
-          <a:p>
-            <a:pPr fontAlgn="base"/>
-            <a:r>
-              <a:rPr lang="en-AU" sz="2000" dirty="0"/>
-              <a:t>Class names should normally use the </a:t>
+              <a:t>names should normally use the </a:t>
             </a:r>
             <a:r>
               <a:rPr lang="en-AU" sz="2000" dirty="0" err="1"/>
@@ -3822,6 +4223,18 @@
             </a:r>
           </a:p>
           <a:p>
+            <a:pPr marL="0" indent="0" fontAlgn="base">
+              <a:buNone/>
+            </a:pPr>
+            <a:endParaRPr lang="en-AU" sz="2000" dirty="0"/>
+          </a:p>
+          <a:p>
+            <a:pPr marL="0" indent="0" fontAlgn="base">
+              <a:buNone/>
+            </a:pPr>
+            <a:endParaRPr lang="en-AU" sz="2000" dirty="0" smtClean="0"/>
+          </a:p>
+          <a:p>
             <a:pPr fontAlgn="base"/>
             <a:r>
               <a:rPr lang="en-AU" sz="2000" dirty="0"/>
@@ -3834,6 +4247,14 @@
           </a:p>
           <a:p>
             <a:pPr fontAlgn="base"/>
+            <a:endParaRPr lang="en-AU" sz="2000" dirty="0"/>
+          </a:p>
+          <a:p>
+            <a:pPr fontAlgn="base"/>
+            <a:endParaRPr lang="en-AU" sz="2000" dirty="0" smtClean="0"/>
+          </a:p>
+          <a:p>
+            <a:pPr fontAlgn="base"/>
             <a:r>
               <a:rPr lang="en-AU" sz="1800" dirty="0"/>
               <a:t>Always use </a:t>
@@ -3854,111 +4275,24 @@
           <a:p>
             <a:pPr fontAlgn="base"/>
             <a:r>
-              <a:rPr lang="en-AU" sz="1800" dirty="0">
-                <a:hlinkClick r:id="rId2"/>
-              </a:rPr>
-              <a:t>Method Names and Instance Variables</a:t>
-            </a:r>
-            <a:endParaRPr lang="en-AU" sz="1800" dirty="0"/>
-          </a:p>
-          <a:p>
-            <a:pPr fontAlgn="base"/>
-            <a:r>
-              <a:rPr lang="en-AU" sz="1800" dirty="0"/>
-              <a:t>Use the function naming rules: lowercase with words separated by underscores as necessary to improve readability</a:t>
-            </a:r>
-          </a:p>
-          <a:p>
-            <a:pPr fontAlgn="base"/>
-            <a:r>
-              <a:rPr lang="en-AU" sz="1600" dirty="0"/>
-              <a:t>Constants are usually defined on a module level and written in all capital letters with underscores separating words. Examples include </a:t>
-            </a:r>
-            <a:r>
-              <a:rPr lang="en-AU" sz="1600" dirty="0" smtClean="0"/>
-              <a:t>MAX_OVERFLOW </a:t>
-            </a:r>
-            <a:r>
-              <a:rPr lang="en-AU" sz="1600" dirty="0"/>
-              <a:t>and </a:t>
-            </a:r>
-            <a:r>
-              <a:rPr lang="en-AU" sz="1600" dirty="0" smtClean="0"/>
-              <a:t>TOTAL</a:t>
-            </a:r>
-          </a:p>
-          <a:p>
-            <a:pPr fontAlgn="base"/>
-            <a:r>
-              <a:rPr lang="en-AU" sz="1600" dirty="0"/>
-              <a:t>Public attributes should have no leading </a:t>
-            </a:r>
-            <a:r>
-              <a:rPr lang="en-AU" sz="1600" dirty="0" smtClean="0"/>
-              <a:t>underscores</a:t>
-            </a:r>
-            <a:br>
-              <a:rPr lang="en-AU" sz="1600" dirty="0" smtClean="0"/>
-            </a:br>
-            <a:r>
-              <a:rPr lang="en-AU" sz="1600" dirty="0" smtClean="0"/>
-              <a:t>1 leading underscore is private (</a:t>
-            </a:r>
-            <a:r>
-              <a:rPr lang="en-AU" sz="1100" dirty="0"/>
-              <a:t>_</a:t>
-            </a:r>
-            <a:r>
-              <a:rPr lang="en-AU" sz="1100" dirty="0" err="1"/>
-              <a:t>single_leading_underscore</a:t>
-            </a:r>
-            <a:r>
-              <a:rPr lang="en-AU" sz="1100" dirty="0"/>
-              <a:t>: weak "internal use" indicator. E.g. </a:t>
-            </a:r>
-            <a:r>
-              <a:rPr lang="en-AU" sz="1100" dirty="0" smtClean="0"/>
-              <a:t>from M import *</a:t>
-            </a:r>
-            <a:r>
-              <a:rPr lang="en-AU" sz="1100" dirty="0"/>
-              <a:t> does not import objects whose name starts with an </a:t>
-            </a:r>
-            <a:r>
-              <a:rPr lang="en-AU" sz="1100" dirty="0" smtClean="0"/>
-              <a:t>underscore)</a:t>
-            </a:r>
-            <a:r>
-              <a:rPr lang="en-AU" sz="1600" dirty="0" smtClean="0"/>
-              <a:t/>
-            </a:r>
-            <a:br>
-              <a:rPr lang="en-AU" sz="1600" dirty="0" smtClean="0"/>
-            </a:br>
-            <a:r>
-              <a:rPr lang="en-AU" sz="1600" dirty="0" smtClean="0"/>
-              <a:t>2 leading underscores are  </a:t>
+              <a:rPr lang="en-AU" sz="1400" dirty="0" smtClean="0"/>
+              <a:t>__</a:t>
             </a:r>
             <a:r>
               <a:rPr lang="en-AU" sz="1400" dirty="0"/>
-              <a:t>“private” instance </a:t>
-            </a:r>
-            <a:r>
-              <a:rPr lang="en-AU" sz="1400" dirty="0" smtClean="0"/>
-              <a:t>variables</a:t>
+              <a:t>foo__: this is just a convention, a way for the Python system to use names that won't conflict with user names.</a:t>
             </a:r>
           </a:p>
           <a:p>
             <a:r>
               <a:rPr lang="en-AU" sz="1400" dirty="0"/>
-              <a:t>__foo__: this is just a convention, a way for the Python system to use names that won't conflict with user names.</a:t>
-            </a:r>
-          </a:p>
-          <a:p>
+              <a:t>_foo: this is just a convention, a way for the programmer to indicate that the variable is private </a:t>
+            </a:r>
             <a:r>
               <a:rPr lang="en-AU" sz="1400" dirty="0"/>
-              <a:t>_foo: this is just a convention, a way for the programmer to indicate that the variable is private (whatever that means in Python).</a:t>
-            </a:r>
+              <a:t>(E.g. from M import * does not import objects whose name starts with an underscore).</a:t>
+            </a:r>
+            <a:endParaRPr lang="en-AU" sz="1400" dirty="0"/>
           </a:p>
           <a:p>
             <a:r>
@@ -4032,7 +4366,7 @@
         </p:nvSpPr>
         <p:spPr bwMode="auto">
           <a:xfrm>
-            <a:off x="3419872" y="1878280"/>
+            <a:off x="8028384" y="2924944"/>
             <a:ext cx="4536504" cy="548481"/>
           </a:xfrm>
           <a:prstGeom prst="rect">
@@ -4376,6 +4710,60 @@
           </a:p>
         </p:txBody>
       </p:sp>
+      <p:pic>
+        <p:nvPicPr>
+          <p:cNvPr id="1026" name="Picture 2"/>
+          <p:cNvPicPr>
+            <a:picLocks noChangeAspect="1" noChangeArrowheads="1"/>
+          </p:cNvPicPr>
+          <p:nvPr/>
+        </p:nvPicPr>
+        <p:blipFill>
+          <a:blip r:embed="rId4">
+            <a:extLst>
+              <a:ext uri="{28A0092B-C50C-407E-A947-70E740481C1C}">
+                <a14:useLocalDpi xmlns:a14="http://schemas.microsoft.com/office/drawing/2010/main" val="0"/>
+              </a:ext>
+            </a:extLst>
+          </a:blip>
+          <a:srcRect/>
+          <a:stretch>
+            <a:fillRect/>
+          </a:stretch>
+        </p:blipFill>
+        <p:spPr bwMode="auto">
+          <a:xfrm>
+            <a:off x="7164288" y="908720"/>
+            <a:ext cx="1209675" cy="885825"/>
+          </a:xfrm>
+          <a:prstGeom prst="rect">
+            <a:avLst/>
+          </a:prstGeom>
+          <a:noFill/>
+          <a:ln>
+            <a:noFill/>
+          </a:ln>
+          <a:extLst>
+            <a:ext uri="{909E8E84-426E-40DD-AFC4-6F175D3DCCD1}">
+              <a14:hiddenFill xmlns:a14="http://schemas.microsoft.com/office/drawing/2010/main">
+                <a:solidFill>
+                  <a:schemeClr val="accent1"/>
+                </a:solidFill>
+              </a14:hiddenFill>
+            </a:ext>
+            <a:ext uri="{91240B29-F687-4F45-9708-019B960494DF}">
+              <a14:hiddenLine xmlns:a14="http://schemas.microsoft.com/office/drawing/2010/main" w="9525">
+                <a:solidFill>
+                  <a:schemeClr val="tx1"/>
+                </a:solidFill>
+                <a:miter lim="800000"/>
+                <a:headEnd/>
+                <a:tailEnd/>
+              </a14:hiddenLine>
+            </a:ext>
+          </a:extLst>
+        </p:spPr>
+      </p:pic>
     </p:spTree>
     <p:extLst>
       <p:ext uri="{BB962C8B-B14F-4D97-AF65-F5344CB8AC3E}">
@@ -4396,7 +4784,7 @@
 </p:sld>
 </file>
 
-<file path=ppt/slides/slide14.xml><?xml version="1.0" encoding="utf-8"?>
+<file path=ppt/slides/slide15.xml><?xml version="1.0" encoding="utf-8"?>
 <p:sld xmlns:a="http://schemas.openxmlformats.org/drawingml/2006/main" xmlns:r="http://schemas.openxmlformats.org/officeDocument/2006/relationships" xmlns:p="http://schemas.openxmlformats.org/presentationml/2006/main">
   <p:cSld>
     <p:spTree>
@@ -4446,12 +4834,54 @@
             <p:ph idx="1"/>
           </p:nvPr>
         </p:nvSpPr>
-        <p:spPr/>
-        <p:txBody>
-          <a:bodyPr/>
-          <a:lstStyle/>
-          <a:p>
-            <a:endParaRPr lang="en-AU"/>
+        <p:spPr>
+          <a:xfrm>
+            <a:off x="444867" y="1340768"/>
+            <a:ext cx="8229600" cy="4525963"/>
+          </a:xfrm>
+        </p:spPr>
+        <p:txBody>
+          <a:bodyPr>
+            <a:normAutofit/>
+          </a:bodyPr>
+          <a:lstStyle/>
+          <a:p>
+            <a:r>
+              <a:rPr lang="en-AU" sz="1800" dirty="0" smtClean="0"/>
+              <a:t>Steering</a:t>
+            </a:r>
+            <a:endParaRPr lang="en-AU" sz="1800" dirty="0" smtClean="0"/>
+          </a:p>
+          <a:p>
+            <a:r>
+              <a:rPr lang="en-AU" sz="1800" dirty="0" smtClean="0"/>
+              <a:t>Adding instrument drivers</a:t>
+            </a:r>
+          </a:p>
+          <a:p>
+            <a:r>
+              <a:rPr lang="en-AU" sz="1800" dirty="0" smtClean="0"/>
+              <a:t>ESR/NMR drive</a:t>
+            </a:r>
+          </a:p>
+          <a:p>
+            <a:r>
+              <a:rPr lang="en-AU" sz="1800" dirty="0" smtClean="0"/>
+              <a:t>GUIs</a:t>
+            </a:r>
+          </a:p>
+          <a:p>
+            <a:r>
+              <a:rPr lang="en-AU" sz="1800" dirty="0" smtClean="0"/>
+              <a:t>In–situ change of loops</a:t>
+            </a:r>
+          </a:p>
+          <a:p>
+            <a:r>
+              <a:rPr lang="en-AU" sz="1800" dirty="0" smtClean="0"/>
+              <a:t>…</a:t>
+            </a:r>
+            <a:endParaRPr lang="en-AU" sz="1800" dirty="0" smtClean="0"/>
           </a:p>
         </p:txBody>
       </p:sp>
@@ -4478,7 +4908,7 @@
         </p:blipFill>
         <p:spPr bwMode="auto">
           <a:xfrm>
-            <a:off x="-12333" y="2857498"/>
+            <a:off x="0" y="3501008"/>
             <a:ext cx="9144000" cy="4000501"/>
           </a:xfrm>
           <a:prstGeom prst="rect">
@@ -4550,7 +4980,7 @@
           <a:p>
             <a:r>
               <a:rPr lang="en-AU" dirty="0" smtClean="0"/>
-              <a:t>Why </a:t>
+              <a:t>Why? </a:t>
             </a:r>
             <a:endParaRPr lang="en-AU" dirty="0"/>
           </a:p>
@@ -4573,14 +5003,16 @@
           </a:xfrm>
         </p:spPr>
         <p:txBody>
-          <a:bodyPr/>
-          <a:lstStyle/>
-          <a:p>
-            <a:r>
-              <a:rPr lang="en-AU" dirty="0" smtClean="0"/>
+          <a:bodyPr>
+            <a:normAutofit/>
+          </a:bodyPr>
+          <a:lstStyle/>
+          <a:p>
+            <a:r>
+              <a:rPr lang="en-AU" sz="2000" dirty="0" smtClean="0"/>
               <a:t>Need to free ourselves from the rule of bad  very task specific coding </a:t>
             </a:r>
-            <a:endParaRPr lang="en-AU" dirty="0"/>
+            <a:endParaRPr lang="en-AU" sz="2000" dirty="0"/>
           </a:p>
         </p:txBody>
       </p:sp>
@@ -4607,7 +5039,7 @@
         </p:blipFill>
         <p:spPr bwMode="auto">
           <a:xfrm>
-            <a:off x="-73024" y="2566749"/>
+            <a:off x="0" y="1916832"/>
             <a:ext cx="9217024" cy="5184576"/>
           </a:xfrm>
           <a:prstGeom prst="rect">
@@ -4648,7 +5080,7 @@
         </p:blipFill>
         <p:spPr bwMode="auto">
           <a:xfrm>
-            <a:off x="258074" y="2996952"/>
+            <a:off x="160288" y="2348880"/>
             <a:ext cx="4320480" cy="822262"/>
           </a:xfrm>
           <a:prstGeom prst="rect">
@@ -4867,48 +5299,116 @@
         </p:nvSpPr>
         <p:spPr/>
         <p:txBody>
-          <a:bodyPr/>
-          <a:lstStyle/>
-          <a:p>
-            <a:r>
-              <a:rPr lang="en-AU" dirty="0" smtClean="0"/>
+          <a:bodyPr>
+            <a:normAutofit/>
+          </a:bodyPr>
+          <a:lstStyle/>
+          <a:p>
+            <a:r>
+              <a:rPr lang="en-AU" sz="2400" dirty="0" smtClean="0"/>
               <a:t>Basic differences</a:t>
             </a:r>
           </a:p>
           <a:p>
             <a:pPr lvl="1"/>
             <a:r>
-              <a:rPr lang="en-AU" dirty="0" smtClean="0"/>
+              <a:rPr lang="en-AU" sz="2000" dirty="0" smtClean="0"/>
               <a:t>Tabs</a:t>
             </a:r>
           </a:p>
           <a:p>
             <a:pPr lvl="1"/>
             <a:r>
-              <a:rPr lang="en-AU" dirty="0" smtClean="0"/>
-              <a:t>No semicolons</a:t>
-            </a:r>
+              <a:rPr lang="en-AU" sz="2000" dirty="0" smtClean="0"/>
+              <a:t>No </a:t>
+            </a:r>
+            <a:r>
+              <a:rPr lang="en-AU" sz="2000" dirty="0" smtClean="0"/>
+              <a:t>semicolons</a:t>
+            </a:r>
+          </a:p>
+          <a:p>
+            <a:pPr lvl="1"/>
+            <a:r>
+              <a:rPr lang="en-AU" sz="2000" dirty="0" smtClean="0"/>
+              <a:t>imports</a:t>
+            </a:r>
+            <a:endParaRPr lang="en-AU" sz="2000" dirty="0" smtClean="0"/>
           </a:p>
           <a:p>
             <a:pPr marL="457200" lvl="1" indent="0">
               <a:buNone/>
             </a:pPr>
             <a:r>
-              <a:rPr lang="en-AU" dirty="0" smtClean="0">
+              <a:rPr lang="en-AU" sz="2000" dirty="0" smtClean="0">
                 <a:hlinkClick r:id="rId2"/>
               </a:rPr>
               <a:t>https://docs.python.org/2/tutorial/</a:t>
             </a:r>
             <a:r>
-              <a:rPr lang="en-AU" dirty="0" smtClean="0"/>
+              <a:rPr lang="en-AU" sz="2000" dirty="0" smtClean="0"/>
               <a:t> </a:t>
             </a:r>
           </a:p>
           <a:p>
-            <a:endParaRPr lang="en-AU" dirty="0"/>
-          </a:p>
-        </p:txBody>
-      </p:sp>
+            <a:endParaRPr lang="en-AU" sz="2400" dirty="0"/>
+          </a:p>
+        </p:txBody>
+      </p:sp>
+      <p:pic>
+        <p:nvPicPr>
+          <p:cNvPr id="2050" name="Picture 2"/>
+          <p:cNvPicPr>
+            <a:picLocks noChangeAspect="1" noChangeArrowheads="1"/>
+          </p:cNvPicPr>
+          <p:nvPr/>
+        </p:nvPicPr>
+        <p:blipFill>
+          <a:blip r:embed="rId3">
+            <a:extLst>
+              <a:ext uri="{28A0092B-C50C-407E-A947-70E740481C1C}">
+                <a14:useLocalDpi xmlns:a14="http://schemas.microsoft.com/office/drawing/2010/main" val="0"/>
+              </a:ext>
+            </a:extLst>
+          </a:blip>
+          <a:srcRect/>
+          <a:stretch>
+            <a:fillRect/>
+          </a:stretch>
+        </p:blipFill>
+        <p:spPr bwMode="auto">
+          <a:xfrm>
+            <a:off x="827584" y="3717032"/>
+            <a:ext cx="5791200" cy="742950"/>
+          </a:xfrm>
+          <a:prstGeom prst="rect">
+            <a:avLst/>
+          </a:prstGeom>
+          <a:noFill/>
+          <a:ln>
+            <a:noFill/>
+          </a:ln>
+          <a:extLst>
+            <a:ext uri="{909E8E84-426E-40DD-AFC4-6F175D3DCCD1}">
+              <a14:hiddenFill xmlns:a14="http://schemas.microsoft.com/office/drawing/2010/main">
+                <a:solidFill>
+                  <a:schemeClr val="accent1"/>
+                </a:solidFill>
+              </a14:hiddenFill>
+            </a:ext>
+            <a:ext uri="{91240B29-F687-4F45-9708-019B960494DF}">
+              <a14:hiddenLine xmlns:a14="http://schemas.microsoft.com/office/drawing/2010/main" w="9525">
+                <a:solidFill>
+                  <a:schemeClr val="tx1"/>
+                </a:solidFill>
+                <a:miter lim="800000"/>
+                <a:headEnd/>
+                <a:tailEnd/>
+              </a14:hiddenLine>
+            </a:ext>
+          </a:extLst>
+        </p:spPr>
+      </p:pic>
     </p:spTree>
     <p:extLst>
       <p:ext uri="{BB962C8B-B14F-4D97-AF65-F5344CB8AC3E}">
@@ -4946,9 +5446,32 @@
           <a:chExt cx="0" cy="0"/>
         </a:xfrm>
       </p:grpSpPr>
+      <p:sp>
+        <p:nvSpPr>
+          <p:cNvPr id="2" name="Title 1"/>
+          <p:cNvSpPr>
+            <a:spLocks noGrp="1"/>
+          </p:cNvSpPr>
+          <p:nvPr>
+            <p:ph type="title"/>
+          </p:nvPr>
+        </p:nvSpPr>
+        <p:spPr/>
+        <p:txBody>
+          <a:bodyPr/>
+          <a:lstStyle/>
+          <a:p>
+            <a:r>
+              <a:rPr lang="en-AU" dirty="0" smtClean="0"/>
+              <a:t>Object oriented programming</a:t>
+            </a:r>
+            <a:endParaRPr lang="en-AU" dirty="0"/>
+          </a:p>
+        </p:txBody>
+      </p:sp>
       <p:pic>
         <p:nvPicPr>
-          <p:cNvPr id="4104" name="Picture 8"/>
+          <p:cNvPr id="4098" name="Picture 2" descr="http://img.wonderhowto.com/img/89/23/63557958543427/0/hack-like-pro-python-scripting-for-aspiring-hacker-part-2.w654.jpg"/>
           <p:cNvPicPr>
             <a:picLocks noChangeAspect="1" noChangeArrowheads="1"/>
           </p:cNvPicPr>
@@ -4969,85 +5492,8 @@
         </p:blipFill>
         <p:spPr bwMode="auto">
           <a:xfrm>
-            <a:off x="98572" y="1526537"/>
-            <a:ext cx="6336704" cy="5057582"/>
-          </a:xfrm>
-          <a:prstGeom prst="rect">
-            <a:avLst/>
-          </a:prstGeom>
-          <a:noFill/>
-          <a:ln>
-            <a:noFill/>
-          </a:ln>
-          <a:extLst>
-            <a:ext uri="{909E8E84-426E-40DD-AFC4-6F175D3DCCD1}">
-              <a14:hiddenFill xmlns:a14="http://schemas.microsoft.com/office/drawing/2010/main">
-                <a:solidFill>
-                  <a:schemeClr val="accent1"/>
-                </a:solidFill>
-              </a14:hiddenFill>
-            </a:ext>
-            <a:ext uri="{91240B29-F687-4F45-9708-019B960494DF}">
-              <a14:hiddenLine xmlns:a14="http://schemas.microsoft.com/office/drawing/2010/main" w="9525">
-                <a:solidFill>
-                  <a:schemeClr val="tx1"/>
-                </a:solidFill>
-                <a:miter lim="800000"/>
-                <a:headEnd/>
-                <a:tailEnd/>
-              </a14:hiddenLine>
-            </a:ext>
-          </a:extLst>
-        </p:spPr>
-      </p:pic>
-      <p:sp>
-        <p:nvSpPr>
-          <p:cNvPr id="2" name="Title 1"/>
-          <p:cNvSpPr>
-            <a:spLocks noGrp="1"/>
-          </p:cNvSpPr>
-          <p:nvPr>
-            <p:ph type="title"/>
-          </p:nvPr>
-        </p:nvSpPr>
-        <p:spPr/>
-        <p:txBody>
-          <a:bodyPr/>
-          <a:lstStyle/>
-          <a:p>
-            <a:r>
-              <a:rPr lang="en-AU" dirty="0" smtClean="0"/>
-              <a:t>Object oriented programming</a:t>
-            </a:r>
-            <a:endParaRPr lang="en-AU" dirty="0"/>
-          </a:p>
-        </p:txBody>
-      </p:sp>
-      <p:pic>
-        <p:nvPicPr>
-          <p:cNvPr id="4098" name="Picture 2" descr="http://img.wonderhowto.com/img/89/23/63557958543427/0/hack-like-pro-python-scripting-for-aspiring-hacker-part-2.w654.jpg"/>
-          <p:cNvPicPr>
-            <a:picLocks noChangeAspect="1" noChangeArrowheads="1"/>
-          </p:cNvPicPr>
-          <p:nvPr/>
-        </p:nvPicPr>
-        <p:blipFill>
-          <a:blip r:embed="rId3">
-            <a:extLst>
-              <a:ext uri="{28A0092B-C50C-407E-A947-70E740481C1C}">
-                <a14:useLocalDpi xmlns:a14="http://schemas.microsoft.com/office/drawing/2010/main" val="0"/>
-              </a:ext>
-            </a:extLst>
-          </a:blip>
-          <a:srcRect/>
-          <a:stretch>
-            <a:fillRect/>
-          </a:stretch>
-        </p:blipFill>
-        <p:spPr bwMode="auto">
-          <a:xfrm>
-            <a:off x="6435276" y="2276872"/>
-            <a:ext cx="2673228" cy="1434980"/>
+            <a:off x="2123728" y="1412776"/>
+            <a:ext cx="4736082" cy="2542313"/>
           </a:xfrm>
           <a:prstGeom prst="rect">
             <a:avLst/>
@@ -5064,354 +5510,6 @@
           </a:extLst>
         </p:spPr>
       </p:pic>
-      <p:pic>
-        <p:nvPicPr>
-          <p:cNvPr id="4100" name="Picture 4" descr="https://upload.wikimedia.org/wikipedia/commons/b/b7/Unico_Anello.png"/>
-          <p:cNvPicPr>
-            <a:picLocks noChangeAspect="1" noChangeArrowheads="1"/>
-          </p:cNvPicPr>
-          <p:nvPr/>
-        </p:nvPicPr>
-        <p:blipFill>
-          <a:blip r:embed="rId4" cstate="print">
-            <a:extLst>
-              <a:ext uri="{28A0092B-C50C-407E-A947-70E740481C1C}">
-                <a14:useLocalDpi xmlns:a14="http://schemas.microsoft.com/office/drawing/2010/main" val="0"/>
-              </a:ext>
-            </a:extLst>
-          </a:blip>
-          <a:srcRect/>
-          <a:stretch>
-            <a:fillRect/>
-          </a:stretch>
-        </p:blipFill>
-        <p:spPr bwMode="auto">
-          <a:xfrm>
-            <a:off x="4932040" y="3459121"/>
-            <a:ext cx="1152128" cy="997311"/>
-          </a:xfrm>
-          <a:prstGeom prst="rect">
-            <a:avLst/>
-          </a:prstGeom>
-          <a:noFill/>
-          <a:extLst>
-            <a:ext uri="{909E8E84-426E-40DD-AFC4-6F175D3DCCD1}">
-              <a14:hiddenFill xmlns:a14="http://schemas.microsoft.com/office/drawing/2010/main">
-                <a:solidFill>
-                  <a:srgbClr val="FFFFFF"/>
-                </a:solidFill>
-              </a14:hiddenFill>
-            </a:ext>
-          </a:extLst>
-        </p:spPr>
-      </p:pic>
-      <p:pic>
-        <p:nvPicPr>
-          <p:cNvPr id="4103" name="Picture 7" descr="http://www.beaverbrooks.co.uk/medias/0005044-0-Large?context=bWFzdGVyfGltYWdlc3wxMDA5Mjl8aW1hZ2UvanBlZ3xpbWFnZXMvODgyOTU3MTI2ODYzOC5qcGd8LQ"/>
-          <p:cNvPicPr>
-            <a:picLocks noChangeAspect="1" noChangeArrowheads="1"/>
-          </p:cNvPicPr>
-          <p:nvPr/>
-        </p:nvPicPr>
-        <p:blipFill>
-          <a:blip r:embed="rId5" cstate="print">
-            <a:extLst>
-              <a:ext uri="{28A0092B-C50C-407E-A947-70E740481C1C}">
-                <a14:useLocalDpi xmlns:a14="http://schemas.microsoft.com/office/drawing/2010/main" val="0"/>
-              </a:ext>
-            </a:extLst>
-          </a:blip>
-          <a:srcRect/>
-          <a:stretch>
-            <a:fillRect/>
-          </a:stretch>
-        </p:blipFill>
-        <p:spPr bwMode="auto">
-          <a:xfrm>
-            <a:off x="5004048" y="1612469"/>
-            <a:ext cx="818988" cy="818988"/>
-          </a:xfrm>
-          <a:prstGeom prst="rect">
-            <a:avLst/>
-          </a:prstGeom>
-          <a:noFill/>
-          <a:extLst>
-            <a:ext uri="{909E8E84-426E-40DD-AFC4-6F175D3DCCD1}">
-              <a14:hiddenFill xmlns:a14="http://schemas.microsoft.com/office/drawing/2010/main">
-                <a:solidFill>
-                  <a:srgbClr val="FFFFFF"/>
-                </a:solidFill>
-              </a14:hiddenFill>
-            </a:ext>
-          </a:extLst>
-        </p:spPr>
-      </p:pic>
-      <p:sp>
-        <p:nvSpPr>
-          <p:cNvPr id="9" name="TextBox 8"/>
-          <p:cNvSpPr txBox="1"/>
-          <p:nvPr/>
-        </p:nvSpPr>
-        <p:spPr>
-          <a:xfrm>
-            <a:off x="2411760" y="4797152"/>
-            <a:ext cx="1152128" cy="369332"/>
-          </a:xfrm>
-          <a:prstGeom prst="rect">
-            <a:avLst/>
-          </a:prstGeom>
-          <a:noFill/>
-        </p:spPr>
-        <p:txBody>
-          <a:bodyPr wrap="square" rtlCol="0">
-            <a:spAutoFit/>
-          </a:bodyPr>
-          <a:lstStyle/>
-          <a:p>
-            <a:r>
-              <a:rPr lang="en-AU" dirty="0" smtClean="0">
-                <a:solidFill>
-                  <a:schemeClr val="bg1"/>
-                </a:solidFill>
-              </a:rPr>
-              <a:t>Instance</a:t>
-            </a:r>
-            <a:endParaRPr lang="en-AU" dirty="0">
-              <a:solidFill>
-                <a:schemeClr val="bg1"/>
-              </a:solidFill>
-            </a:endParaRPr>
-          </a:p>
-        </p:txBody>
-      </p:sp>
-      <p:sp>
-        <p:nvSpPr>
-          <p:cNvPr id="15" name="TextBox 14"/>
-          <p:cNvSpPr txBox="1"/>
-          <p:nvPr/>
-        </p:nvSpPr>
-        <p:spPr>
-          <a:xfrm>
-            <a:off x="70752" y="2998819"/>
-            <a:ext cx="1152128" cy="369332"/>
-          </a:xfrm>
-          <a:prstGeom prst="rect">
-            <a:avLst/>
-          </a:prstGeom>
-          <a:noFill/>
-        </p:spPr>
-        <p:txBody>
-          <a:bodyPr wrap="square" rtlCol="0">
-            <a:spAutoFit/>
-          </a:bodyPr>
-          <a:lstStyle/>
-          <a:p>
-            <a:r>
-              <a:rPr lang="en-AU" dirty="0" smtClean="0">
-                <a:solidFill>
-                  <a:schemeClr val="bg1"/>
-                </a:solidFill>
-              </a:rPr>
-              <a:t>Class</a:t>
-            </a:r>
-            <a:endParaRPr lang="en-AU" dirty="0">
-              <a:solidFill>
-                <a:schemeClr val="bg1"/>
-              </a:solidFill>
-            </a:endParaRPr>
-          </a:p>
-        </p:txBody>
-      </p:sp>
-      <p:sp>
-        <p:nvSpPr>
-          <p:cNvPr id="16" name="TextBox 15"/>
-          <p:cNvSpPr txBox="1"/>
-          <p:nvPr/>
-        </p:nvSpPr>
-        <p:spPr>
-          <a:xfrm>
-            <a:off x="98572" y="1817962"/>
-            <a:ext cx="1152128" cy="646331"/>
-          </a:xfrm>
-          <a:prstGeom prst="rect">
-            <a:avLst/>
-          </a:prstGeom>
-          <a:noFill/>
-        </p:spPr>
-        <p:txBody>
-          <a:bodyPr wrap="square" rtlCol="0">
-            <a:spAutoFit/>
-          </a:bodyPr>
-          <a:lstStyle/>
-          <a:p>
-            <a:r>
-              <a:rPr lang="en-AU" dirty="0" err="1" smtClean="0">
-                <a:solidFill>
-                  <a:schemeClr val="bg1"/>
-                </a:solidFill>
-              </a:rPr>
-              <a:t>SuperClass</a:t>
-            </a:r>
-            <a:endParaRPr lang="en-AU" dirty="0">
-              <a:solidFill>
-                <a:schemeClr val="bg1"/>
-              </a:solidFill>
-            </a:endParaRPr>
-          </a:p>
-        </p:txBody>
-      </p:sp>
-      <p:sp>
-        <p:nvSpPr>
-          <p:cNvPr id="17" name="TextBox 16"/>
-          <p:cNvSpPr txBox="1"/>
-          <p:nvPr/>
-        </p:nvSpPr>
-        <p:spPr>
-          <a:xfrm>
-            <a:off x="2820841" y="3962397"/>
-            <a:ext cx="1152128" cy="369332"/>
-          </a:xfrm>
-          <a:prstGeom prst="rect">
-            <a:avLst/>
-          </a:prstGeom>
-          <a:noFill/>
-        </p:spPr>
-        <p:txBody>
-          <a:bodyPr wrap="square" rtlCol="0">
-            <a:spAutoFit/>
-          </a:bodyPr>
-          <a:lstStyle/>
-          <a:p>
-            <a:r>
-              <a:rPr lang="en-AU" dirty="0" smtClean="0">
-                <a:solidFill>
-                  <a:schemeClr val="bg1"/>
-                </a:solidFill>
-              </a:rPr>
-              <a:t>Method</a:t>
-            </a:r>
-            <a:endParaRPr lang="en-AU" dirty="0">
-              <a:solidFill>
-                <a:schemeClr val="bg1"/>
-              </a:solidFill>
-            </a:endParaRPr>
-          </a:p>
-        </p:txBody>
-      </p:sp>
-      <p:sp>
-        <p:nvSpPr>
-          <p:cNvPr id="18" name="TextBox 17"/>
-          <p:cNvSpPr txBox="1"/>
-          <p:nvPr/>
-        </p:nvSpPr>
-        <p:spPr>
-          <a:xfrm>
-            <a:off x="2690860" y="2092206"/>
-            <a:ext cx="1152128" cy="369332"/>
-          </a:xfrm>
-          <a:prstGeom prst="rect">
-            <a:avLst/>
-          </a:prstGeom>
-          <a:noFill/>
-        </p:spPr>
-        <p:txBody>
-          <a:bodyPr wrap="square" rtlCol="0">
-            <a:spAutoFit/>
-          </a:bodyPr>
-          <a:lstStyle/>
-          <a:p>
-            <a:r>
-              <a:rPr lang="en-AU" dirty="0" smtClean="0">
-                <a:solidFill>
-                  <a:schemeClr val="bg1"/>
-                </a:solidFill>
-              </a:rPr>
-              <a:t>Properties</a:t>
-            </a:r>
-            <a:endParaRPr lang="en-AU" dirty="0">
-              <a:solidFill>
-                <a:schemeClr val="bg1"/>
-              </a:solidFill>
-            </a:endParaRPr>
-          </a:p>
-        </p:txBody>
-      </p:sp>
-      <p:sp>
-        <p:nvSpPr>
-          <p:cNvPr id="19" name="TextBox 18"/>
-          <p:cNvSpPr txBox="1"/>
-          <p:nvPr/>
-        </p:nvSpPr>
-        <p:spPr>
-          <a:xfrm>
-            <a:off x="2987824" y="3342140"/>
-            <a:ext cx="1152128" cy="369332"/>
-          </a:xfrm>
-          <a:prstGeom prst="rect">
-            <a:avLst/>
-          </a:prstGeom>
-          <a:noFill/>
-        </p:spPr>
-        <p:txBody>
-          <a:bodyPr wrap="square" rtlCol="0">
-            <a:spAutoFit/>
-          </a:bodyPr>
-          <a:lstStyle/>
-          <a:p>
-            <a:r>
-              <a:rPr lang="en-AU" dirty="0" smtClean="0">
-                <a:solidFill>
-                  <a:schemeClr val="bg1"/>
-                </a:solidFill>
-              </a:rPr>
-              <a:t>Properties</a:t>
-            </a:r>
-            <a:endParaRPr lang="en-AU" dirty="0">
-              <a:solidFill>
-                <a:schemeClr val="bg1"/>
-              </a:solidFill>
-            </a:endParaRPr>
-          </a:p>
-        </p:txBody>
-      </p:sp>
-      <p:sp>
-        <p:nvSpPr>
-          <p:cNvPr id="20" name="TextBox 19"/>
-          <p:cNvSpPr txBox="1"/>
-          <p:nvPr/>
-        </p:nvSpPr>
-        <p:spPr>
-          <a:xfrm>
-            <a:off x="4788024" y="2924944"/>
-            <a:ext cx="1935832" cy="369332"/>
-          </a:xfrm>
-          <a:prstGeom prst="rect">
-            <a:avLst/>
-          </a:prstGeom>
-          <a:noFill/>
-        </p:spPr>
-        <p:txBody>
-          <a:bodyPr wrap="square" rtlCol="0">
-            <a:spAutoFit/>
-          </a:bodyPr>
-          <a:lstStyle/>
-          <a:p>
-            <a:r>
-              <a:rPr lang="en-AU" dirty="0" smtClean="0">
-                <a:solidFill>
-                  <a:schemeClr val="bg1"/>
-                </a:solidFill>
-              </a:rPr>
-              <a:t>Initialization</a:t>
-            </a:r>
-            <a:endParaRPr lang="en-AU" dirty="0">
-              <a:solidFill>
-                <a:schemeClr val="bg1"/>
-              </a:solidFill>
-            </a:endParaRPr>
-          </a:p>
-        </p:txBody>
-      </p:sp>
     </p:spTree>
     <p:extLst>
       <p:ext uri="{BB962C8B-B14F-4D97-AF65-F5344CB8AC3E}">
@@ -5449,6 +5547,438 @@
           <a:chExt cx="0" cy="0"/>
         </a:xfrm>
       </p:grpSpPr>
+      <p:pic>
+        <p:nvPicPr>
+          <p:cNvPr id="4" name="Picture 8"/>
+          <p:cNvPicPr>
+            <a:picLocks noChangeAspect="1" noChangeArrowheads="1"/>
+          </p:cNvPicPr>
+          <p:nvPr/>
+        </p:nvPicPr>
+        <p:blipFill>
+          <a:blip r:embed="rId2">
+            <a:extLst>
+              <a:ext uri="{28A0092B-C50C-407E-A947-70E740481C1C}">
+                <a14:useLocalDpi xmlns:a14="http://schemas.microsoft.com/office/drawing/2010/main" val="0"/>
+              </a:ext>
+            </a:extLst>
+          </a:blip>
+          <a:srcRect/>
+          <a:stretch>
+            <a:fillRect/>
+          </a:stretch>
+        </p:blipFill>
+        <p:spPr bwMode="auto">
+          <a:xfrm>
+            <a:off x="917113" y="275854"/>
+            <a:ext cx="7903701" cy="6308266"/>
+          </a:xfrm>
+          <a:prstGeom prst="rect">
+            <a:avLst/>
+          </a:prstGeom>
+          <a:noFill/>
+          <a:ln>
+            <a:noFill/>
+          </a:ln>
+          <a:extLst>
+            <a:ext uri="{909E8E84-426E-40DD-AFC4-6F175D3DCCD1}">
+              <a14:hiddenFill xmlns:a14="http://schemas.microsoft.com/office/drawing/2010/main">
+                <a:solidFill>
+                  <a:schemeClr val="accent1"/>
+                </a:solidFill>
+              </a14:hiddenFill>
+            </a:ext>
+            <a:ext uri="{91240B29-F687-4F45-9708-019B960494DF}">
+              <a14:hiddenLine xmlns:a14="http://schemas.microsoft.com/office/drawing/2010/main" w="9525">
+                <a:solidFill>
+                  <a:schemeClr val="tx1"/>
+                </a:solidFill>
+                <a:miter lim="800000"/>
+                <a:headEnd/>
+                <a:tailEnd/>
+              </a14:hiddenLine>
+            </a:ext>
+          </a:extLst>
+        </p:spPr>
+      </p:pic>
+      <p:pic>
+        <p:nvPicPr>
+          <p:cNvPr id="5" name="Picture 4" descr="https://upload.wikimedia.org/wikipedia/commons/b/b7/Unico_Anello.png"/>
+          <p:cNvPicPr>
+            <a:picLocks noChangeAspect="1" noChangeArrowheads="1"/>
+          </p:cNvPicPr>
+          <p:nvPr/>
+        </p:nvPicPr>
+        <p:blipFill>
+          <a:blip r:embed="rId3" cstate="print">
+            <a:extLst>
+              <a:ext uri="{28A0092B-C50C-407E-A947-70E740481C1C}">
+                <a14:useLocalDpi xmlns:a14="http://schemas.microsoft.com/office/drawing/2010/main" val="0"/>
+              </a:ext>
+            </a:extLst>
+          </a:blip>
+          <a:srcRect/>
+          <a:stretch>
+            <a:fillRect/>
+          </a:stretch>
+        </p:blipFill>
+        <p:spPr bwMode="auto">
+          <a:xfrm>
+            <a:off x="7222664" y="2541440"/>
+            <a:ext cx="1152128" cy="997311"/>
+          </a:xfrm>
+          <a:prstGeom prst="rect">
+            <a:avLst/>
+          </a:prstGeom>
+          <a:noFill/>
+          <a:extLst>
+            <a:ext uri="{909E8E84-426E-40DD-AFC4-6F175D3DCCD1}">
+              <a14:hiddenFill xmlns:a14="http://schemas.microsoft.com/office/drawing/2010/main">
+                <a:solidFill>
+                  <a:srgbClr val="FFFFFF"/>
+                </a:solidFill>
+              </a14:hiddenFill>
+            </a:ext>
+          </a:extLst>
+        </p:spPr>
+      </p:pic>
+      <p:pic>
+        <p:nvPicPr>
+          <p:cNvPr id="6" name="Picture 7" descr="http://www.beaverbrooks.co.uk/medias/0005044-0-Large?context=bWFzdGVyfGltYWdlc3wxMDA5Mjl8aW1hZ2UvanBlZ3xpbWFnZXMvODgyOTU3MTI2ODYzOC5qcGd8LQ"/>
+          <p:cNvPicPr>
+            <a:picLocks noChangeAspect="1" noChangeArrowheads="1"/>
+          </p:cNvPicPr>
+          <p:nvPr/>
+        </p:nvPicPr>
+        <p:blipFill>
+          <a:blip r:embed="rId4" cstate="print">
+            <a:extLst>
+              <a:ext uri="{28A0092B-C50C-407E-A947-70E740481C1C}">
+                <a14:useLocalDpi xmlns:a14="http://schemas.microsoft.com/office/drawing/2010/main" val="0"/>
+              </a:ext>
+            </a:extLst>
+          </a:blip>
+          <a:srcRect/>
+          <a:stretch>
+            <a:fillRect/>
+          </a:stretch>
+        </p:blipFill>
+        <p:spPr bwMode="auto">
+          <a:xfrm>
+            <a:off x="7209944" y="600296"/>
+            <a:ext cx="818988" cy="818988"/>
+          </a:xfrm>
+          <a:prstGeom prst="rect">
+            <a:avLst/>
+          </a:prstGeom>
+          <a:noFill/>
+          <a:extLst>
+            <a:ext uri="{909E8E84-426E-40DD-AFC4-6F175D3DCCD1}">
+              <a14:hiddenFill xmlns:a14="http://schemas.microsoft.com/office/drawing/2010/main">
+                <a:solidFill>
+                  <a:srgbClr val="FFFFFF"/>
+                </a:solidFill>
+              </a14:hiddenFill>
+            </a:ext>
+          </a:extLst>
+        </p:spPr>
+      </p:pic>
+      <p:sp>
+        <p:nvSpPr>
+          <p:cNvPr id="7" name="TextBox 6"/>
+          <p:cNvSpPr txBox="1"/>
+          <p:nvPr/>
+        </p:nvSpPr>
+        <p:spPr>
+          <a:xfrm rot="16200000">
+            <a:off x="12072" y="4866561"/>
+            <a:ext cx="1152128" cy="369332"/>
+          </a:xfrm>
+          <a:prstGeom prst="rect">
+            <a:avLst/>
+          </a:prstGeom>
+          <a:noFill/>
+        </p:spPr>
+        <p:txBody>
+          <a:bodyPr wrap="square" rtlCol="0">
+            <a:spAutoFit/>
+          </a:bodyPr>
+          <a:lstStyle/>
+          <a:p>
+            <a:r>
+              <a:rPr lang="en-AU" dirty="0" smtClean="0">
+                <a:solidFill>
+                  <a:schemeClr val="tx2"/>
+                </a:solidFill>
+              </a:rPr>
+              <a:t>Instance</a:t>
+            </a:r>
+            <a:endParaRPr lang="en-AU" dirty="0">
+              <a:solidFill>
+                <a:schemeClr val="tx2"/>
+              </a:solidFill>
+            </a:endParaRPr>
+          </a:p>
+        </p:txBody>
+      </p:sp>
+      <p:sp>
+        <p:nvSpPr>
+          <p:cNvPr id="8" name="TextBox 7"/>
+          <p:cNvSpPr txBox="1"/>
+          <p:nvPr/>
+        </p:nvSpPr>
+        <p:spPr>
+          <a:xfrm rot="16200000">
+            <a:off x="-8663" y="2092206"/>
+            <a:ext cx="1152128" cy="369332"/>
+          </a:xfrm>
+          <a:prstGeom prst="rect">
+            <a:avLst/>
+          </a:prstGeom>
+          <a:noFill/>
+        </p:spPr>
+        <p:txBody>
+          <a:bodyPr wrap="square" rtlCol="0">
+            <a:spAutoFit/>
+          </a:bodyPr>
+          <a:lstStyle/>
+          <a:p>
+            <a:r>
+              <a:rPr lang="en-AU" dirty="0" smtClean="0">
+                <a:solidFill>
+                  <a:schemeClr val="tx2"/>
+                </a:solidFill>
+              </a:rPr>
+              <a:t>Class</a:t>
+            </a:r>
+            <a:endParaRPr lang="en-AU" dirty="0">
+              <a:solidFill>
+                <a:schemeClr val="tx2"/>
+              </a:solidFill>
+            </a:endParaRPr>
+          </a:p>
+        </p:txBody>
+      </p:sp>
+      <p:sp>
+        <p:nvSpPr>
+          <p:cNvPr id="9" name="TextBox 8"/>
+          <p:cNvSpPr txBox="1"/>
+          <p:nvPr/>
+        </p:nvSpPr>
+        <p:spPr>
+          <a:xfrm rot="16200000">
+            <a:off x="-180349" y="692516"/>
+            <a:ext cx="1521100" cy="369332"/>
+          </a:xfrm>
+          <a:prstGeom prst="rect">
+            <a:avLst/>
+          </a:prstGeom>
+          <a:noFill/>
+        </p:spPr>
+        <p:txBody>
+          <a:bodyPr wrap="square" rtlCol="0">
+            <a:spAutoFit/>
+          </a:bodyPr>
+          <a:lstStyle/>
+          <a:p>
+            <a:r>
+              <a:rPr lang="en-AU" dirty="0" err="1" smtClean="0">
+                <a:solidFill>
+                  <a:schemeClr val="tx2"/>
+                </a:solidFill>
+              </a:rPr>
+              <a:t>SuperClass</a:t>
+            </a:r>
+            <a:endParaRPr lang="en-AU" dirty="0">
+              <a:solidFill>
+                <a:schemeClr val="tx2"/>
+              </a:solidFill>
+            </a:endParaRPr>
+          </a:p>
+        </p:txBody>
+      </p:sp>
+      <p:sp>
+        <p:nvSpPr>
+          <p:cNvPr id="10" name="TextBox 9"/>
+          <p:cNvSpPr txBox="1"/>
+          <p:nvPr/>
+        </p:nvSpPr>
+        <p:spPr>
+          <a:xfrm>
+            <a:off x="4125917" y="3962397"/>
+            <a:ext cx="1152128" cy="369332"/>
+          </a:xfrm>
+          <a:prstGeom prst="rect">
+            <a:avLst/>
+          </a:prstGeom>
+          <a:noFill/>
+        </p:spPr>
+        <p:txBody>
+          <a:bodyPr wrap="square" rtlCol="0">
+            <a:spAutoFit/>
+          </a:bodyPr>
+          <a:lstStyle/>
+          <a:p>
+            <a:r>
+              <a:rPr lang="en-AU" dirty="0" smtClean="0">
+                <a:solidFill>
+                  <a:schemeClr val="bg1"/>
+                </a:solidFill>
+              </a:rPr>
+              <a:t>Method</a:t>
+            </a:r>
+            <a:endParaRPr lang="en-AU" dirty="0">
+              <a:solidFill>
+                <a:schemeClr val="bg1"/>
+              </a:solidFill>
+            </a:endParaRPr>
+          </a:p>
+        </p:txBody>
+      </p:sp>
+      <p:sp>
+        <p:nvSpPr>
+          <p:cNvPr id="11" name="TextBox 10"/>
+          <p:cNvSpPr txBox="1"/>
+          <p:nvPr/>
+        </p:nvSpPr>
+        <p:spPr>
+          <a:xfrm>
+            <a:off x="3995936" y="2092206"/>
+            <a:ext cx="1152128" cy="369332"/>
+          </a:xfrm>
+          <a:prstGeom prst="rect">
+            <a:avLst/>
+          </a:prstGeom>
+          <a:noFill/>
+        </p:spPr>
+        <p:txBody>
+          <a:bodyPr wrap="square" rtlCol="0">
+            <a:spAutoFit/>
+          </a:bodyPr>
+          <a:lstStyle/>
+          <a:p>
+            <a:r>
+              <a:rPr lang="en-AU" dirty="0" smtClean="0">
+                <a:solidFill>
+                  <a:schemeClr val="bg1"/>
+                </a:solidFill>
+              </a:rPr>
+              <a:t>Properties</a:t>
+            </a:r>
+            <a:endParaRPr lang="en-AU" dirty="0">
+              <a:solidFill>
+                <a:schemeClr val="bg1"/>
+              </a:solidFill>
+            </a:endParaRPr>
+          </a:p>
+        </p:txBody>
+      </p:sp>
+      <p:sp>
+        <p:nvSpPr>
+          <p:cNvPr id="12" name="TextBox 11"/>
+          <p:cNvSpPr txBox="1"/>
+          <p:nvPr/>
+        </p:nvSpPr>
+        <p:spPr>
+          <a:xfrm>
+            <a:off x="4292900" y="3342140"/>
+            <a:ext cx="1152128" cy="369332"/>
+          </a:xfrm>
+          <a:prstGeom prst="rect">
+            <a:avLst/>
+          </a:prstGeom>
+          <a:noFill/>
+        </p:spPr>
+        <p:txBody>
+          <a:bodyPr wrap="square" rtlCol="0">
+            <a:spAutoFit/>
+          </a:bodyPr>
+          <a:lstStyle/>
+          <a:p>
+            <a:r>
+              <a:rPr lang="en-AU" dirty="0" smtClean="0">
+                <a:solidFill>
+                  <a:schemeClr val="bg1"/>
+                </a:solidFill>
+              </a:rPr>
+              <a:t>Properties</a:t>
+            </a:r>
+            <a:endParaRPr lang="en-AU" dirty="0">
+              <a:solidFill>
+                <a:schemeClr val="bg1"/>
+              </a:solidFill>
+            </a:endParaRPr>
+          </a:p>
+        </p:txBody>
+      </p:sp>
+      <p:sp>
+        <p:nvSpPr>
+          <p:cNvPr id="13" name="TextBox 12"/>
+          <p:cNvSpPr txBox="1"/>
+          <p:nvPr/>
+        </p:nvSpPr>
+        <p:spPr>
+          <a:xfrm>
+            <a:off x="5278045" y="2566440"/>
+            <a:ext cx="1935832" cy="369332"/>
+          </a:xfrm>
+          <a:prstGeom prst="rect">
+            <a:avLst/>
+          </a:prstGeom>
+          <a:noFill/>
+        </p:spPr>
+        <p:txBody>
+          <a:bodyPr wrap="square" rtlCol="0">
+            <a:spAutoFit/>
+          </a:bodyPr>
+          <a:lstStyle/>
+          <a:p>
+            <a:r>
+              <a:rPr lang="en-AU" dirty="0" smtClean="0">
+                <a:solidFill>
+                  <a:schemeClr val="bg1"/>
+                </a:solidFill>
+              </a:rPr>
+              <a:t>Initialization</a:t>
+            </a:r>
+            <a:endParaRPr lang="en-AU" dirty="0">
+              <a:solidFill>
+                <a:schemeClr val="bg1"/>
+              </a:solidFill>
+            </a:endParaRPr>
+          </a:p>
+        </p:txBody>
+      </p:sp>
+    </p:spTree>
+    <p:extLst>
+      <p:ext uri="{BB962C8B-B14F-4D97-AF65-F5344CB8AC3E}">
+        <p14:creationId xmlns:p14="http://schemas.microsoft.com/office/powerpoint/2010/main" val="3952153688"/>
+      </p:ext>
+    </p:extLst>
+  </p:cSld>
+  <p:clrMapOvr>
+    <a:masterClrMapping/>
+  </p:clrMapOvr>
+</p:sld>
+</file>
+
+<file path=ppt/slides/slide7.xml><?xml version="1.0" encoding="utf-8"?>
+<p:sld xmlns:a="http://schemas.openxmlformats.org/drawingml/2006/main" xmlns:r="http://schemas.openxmlformats.org/officeDocument/2006/relationships" xmlns:p="http://schemas.openxmlformats.org/presentationml/2006/main">
+  <p:cSld>
+    <p:spTree>
+      <p:nvGrpSpPr>
+        <p:cNvPr id="1" name=""/>
+        <p:cNvGrpSpPr/>
+        <p:nvPr/>
+      </p:nvGrpSpPr>
+      <p:grpSpPr>
+        <a:xfrm>
+          <a:off x="0" y="0"/>
+          <a:ext cx="0" cy="0"/>
+          <a:chOff x="0" y="0"/>
+          <a:chExt cx="0" cy="0"/>
+        </a:xfrm>
+      </p:grpSpPr>
       <p:sp>
         <p:nvSpPr>
           <p:cNvPr id="2" name="Title 1"/>
@@ -5519,7 +6049,7 @@
 </p:sld>
 </file>
 
-<file path=ppt/slides/slide7.xml><?xml version="1.0" encoding="utf-8"?>
+<file path=ppt/slides/slide8.xml><?xml version="1.0" encoding="utf-8"?>
 <p:sld xmlns:a="http://schemas.openxmlformats.org/drawingml/2006/main" xmlns:r="http://schemas.openxmlformats.org/officeDocument/2006/relationships" xmlns:p="http://schemas.openxmlformats.org/presentationml/2006/main">
   <p:cSld>
     <p:spTree>
@@ -5655,7 +6185,7 @@
           <a:prstGeom prst="straightConnector1">
             <a:avLst/>
           </a:prstGeom>
-          <a:ln>
+          <a:ln w="57150">
             <a:tailEnd type="arrow"/>
           </a:ln>
         </p:spPr>
@@ -5697,8 +6227,8 @@
         </p:blipFill>
         <p:spPr bwMode="auto">
           <a:xfrm>
-            <a:off x="7020272" y="1551806"/>
-            <a:ext cx="2381250" cy="2381250"/>
+            <a:off x="6804248" y="1700808"/>
+            <a:ext cx="2039530" cy="2039530"/>
           </a:xfrm>
           <a:prstGeom prst="rect">
             <a:avLst/>
@@ -5729,7 +6259,7 @@
           <a:prstGeom prst="straightConnector1">
             <a:avLst/>
           </a:prstGeom>
-          <a:ln>
+          <a:ln w="57150">
             <a:tailEnd type="arrow"/>
           </a:ln>
         </p:spPr>
@@ -5768,131 +6298,6 @@
 </p:sld>
 </file>
 
-<file path=ppt/slides/slide8.xml><?xml version="1.0" encoding="utf-8"?>
-<p:sld xmlns:a="http://schemas.openxmlformats.org/drawingml/2006/main" xmlns:r="http://schemas.openxmlformats.org/officeDocument/2006/relationships" xmlns:p="http://schemas.openxmlformats.org/presentationml/2006/main">
-  <p:cSld>
-    <p:spTree>
-      <p:nvGrpSpPr>
-        <p:cNvPr id="1" name=""/>
-        <p:cNvGrpSpPr/>
-        <p:nvPr/>
-      </p:nvGrpSpPr>
-      <p:grpSpPr>
-        <a:xfrm>
-          <a:off x="0" y="0"/>
-          <a:ext cx="0" cy="0"/>
-          <a:chOff x="0" y="0"/>
-          <a:chExt cx="0" cy="0"/>
-        </a:xfrm>
-      </p:grpSpPr>
-      <p:sp>
-        <p:nvSpPr>
-          <p:cNvPr id="3" name="Content Placeholder 2"/>
-          <p:cNvSpPr>
-            <a:spLocks noGrp="1"/>
-          </p:cNvSpPr>
-          <p:nvPr>
-            <p:ph idx="1"/>
-          </p:nvPr>
-        </p:nvSpPr>
-        <p:spPr/>
-        <p:txBody>
-          <a:bodyPr/>
-          <a:lstStyle/>
-          <a:p>
-            <a:endParaRPr lang="en-AU"/>
-          </a:p>
-        </p:txBody>
-      </p:sp>
-      <p:pic>
-        <p:nvPicPr>
-          <p:cNvPr id="4" name="Picture 4" descr="https://ipython.org/_static/IPy_header.png"/>
-          <p:cNvPicPr>
-            <a:picLocks noChangeAspect="1" noChangeArrowheads="1"/>
-          </p:cNvPicPr>
-          <p:nvPr/>
-        </p:nvPicPr>
-        <p:blipFill>
-          <a:blip r:embed="rId2">
-            <a:extLst>
-              <a:ext uri="{28A0092B-C50C-407E-A947-70E740481C1C}">
-                <a14:useLocalDpi xmlns:a14="http://schemas.microsoft.com/office/drawing/2010/main" val="0"/>
-              </a:ext>
-            </a:extLst>
-          </a:blip>
-          <a:srcRect/>
-          <a:stretch>
-            <a:fillRect/>
-          </a:stretch>
-        </p:blipFill>
-        <p:spPr bwMode="auto">
-          <a:xfrm>
-            <a:off x="611560" y="476672"/>
-            <a:ext cx="4953000" cy="638175"/>
-          </a:xfrm>
-          <a:prstGeom prst="rect">
-            <a:avLst/>
-          </a:prstGeom>
-          <a:noFill/>
-          <a:extLst>
-            <a:ext uri="{909E8E84-426E-40DD-AFC4-6F175D3DCCD1}">
-              <a14:hiddenFill xmlns:a14="http://schemas.microsoft.com/office/drawing/2010/main">
-                <a:solidFill>
-                  <a:srgbClr val="FFFFFF"/>
-                </a:solidFill>
-              </a14:hiddenFill>
-            </a:ext>
-          </a:extLst>
-        </p:spPr>
-      </p:pic>
-      <p:sp>
-        <p:nvSpPr>
-          <p:cNvPr id="5" name="Title 1"/>
-          <p:cNvSpPr>
-            <a:spLocks noGrp="1"/>
-          </p:cNvSpPr>
-          <p:nvPr>
-            <p:ph type="title"/>
-          </p:nvPr>
-        </p:nvSpPr>
-        <p:spPr>
-          <a:xfrm>
-            <a:off x="5564560" y="274638"/>
-            <a:ext cx="3122240" cy="1143000"/>
-          </a:xfrm>
-        </p:spPr>
-        <p:txBody>
-          <a:bodyPr/>
-          <a:lstStyle/>
-          <a:p>
-            <a:r>
-              <a:rPr lang="en-AU" dirty="0" smtClean="0"/>
-              <a:t>Notebook</a:t>
-            </a:r>
-            <a:endParaRPr lang="en-AU" dirty="0"/>
-          </a:p>
-        </p:txBody>
-      </p:sp>
-    </p:spTree>
-    <p:extLst>
-      <p:ext uri="{BB962C8B-B14F-4D97-AF65-F5344CB8AC3E}">
-        <p14:creationId xmlns:p14="http://schemas.microsoft.com/office/powerpoint/2010/main" val="2198001099"/>
-      </p:ext>
-    </p:extLst>
-  </p:cSld>
-  <p:clrMapOvr>
-    <a:masterClrMapping/>
-  </p:clrMapOvr>
-  <p:timing>
-    <p:tnLst>
-      <p:par>
-        <p:cTn id="1" dur="indefinite" restart="never" nodeType="tmRoot"/>
-      </p:par>
-    </p:tnLst>
-  </p:timing>
-</p:sld>
-</file>
-
 <file path=ppt/slides/slide9.xml><?xml version="1.0" encoding="utf-8"?>
 <p:sld xmlns:a="http://schemas.openxmlformats.org/drawingml/2006/main" xmlns:r="http://schemas.openxmlformats.org/officeDocument/2006/relationships" xmlns:p="http://schemas.openxmlformats.org/presentationml/2006/main">
   <p:cSld>
@@ -5943,12 +6348,70 @@
             <p:ph idx="1"/>
           </p:nvPr>
         </p:nvSpPr>
-        <p:spPr/>
-        <p:txBody>
-          <a:bodyPr/>
-          <a:lstStyle/>
-          <a:p>
-            <a:endParaRPr lang="en-AU"/>
+        <p:spPr>
+          <a:xfrm>
+            <a:off x="467544" y="1756065"/>
+            <a:ext cx="8229600" cy="4525963"/>
+          </a:xfrm>
+        </p:spPr>
+        <p:txBody>
+          <a:bodyPr>
+            <a:normAutofit/>
+          </a:bodyPr>
+          <a:lstStyle/>
+          <a:p>
+            <a:r>
+              <a:rPr lang="en-AU" sz="2000" b="1" dirty="0"/>
+              <a:t>if </a:t>
+            </a:r>
+            <a:r>
+              <a:rPr lang="en-AU" sz="2000" dirty="0"/>
+              <a:t>__name__ == </a:t>
+            </a:r>
+            <a:r>
+              <a:rPr lang="en-AU" sz="2000" dirty="0"/>
+              <a:t>"__main__"</a:t>
+            </a:r>
+            <a:r>
+              <a:rPr lang="en-AU" sz="2000" dirty="0"/>
+              <a:t>:</a:t>
+            </a:r>
+            <a:br>
+              <a:rPr lang="en-AU" sz="2000" dirty="0"/>
+            </a:br>
+            <a:r>
+              <a:rPr lang="en-AU" sz="2000" dirty="0"/>
+              <a:t>    ATS = ATS_driver.ATS9440(</a:t>
+            </a:r>
+            <a:r>
+              <a:rPr lang="en-AU" sz="2000" dirty="0"/>
+              <a:t>'ATS', </a:t>
+            </a:r>
+            <a:r>
+              <a:rPr lang="en-AU" sz="2000" dirty="0" err="1"/>
+              <a:t>server_name</a:t>
+            </a:r>
+            <a:r>
+              <a:rPr lang="en-AU" sz="2000" dirty="0"/>
+              <a:t>=</a:t>
+            </a:r>
+            <a:r>
+              <a:rPr lang="en-AU" sz="2000" dirty="0"/>
+              <a:t>'</a:t>
+            </a:r>
+            <a:r>
+              <a:rPr lang="en-AU" sz="2000" dirty="0" err="1"/>
+              <a:t>Alazar_server</a:t>
+            </a:r>
+            <a:r>
+              <a:rPr lang="en-AU" sz="2000" dirty="0"/>
+              <a:t>'</a:t>
+            </a:r>
+            <a:r>
+              <a:rPr lang="en-AU" sz="2000" dirty="0"/>
+              <a:t>)</a:t>
+            </a:r>
+            <a:endParaRPr lang="en-AU" sz="2000" dirty="0"/>
           </a:p>
         </p:txBody>
       </p:sp>
@@ -5975,8 +6438,8 @@
         </p:blipFill>
         <p:spPr bwMode="auto">
           <a:xfrm>
-            <a:off x="611560" y="-16751"/>
-            <a:ext cx="1772816" cy="1772816"/>
+            <a:off x="646618" y="116632"/>
+            <a:ext cx="1645551" cy="1645551"/>
           </a:xfrm>
           <a:prstGeom prst="rect">
             <a:avLst/>
@@ -5989,6 +6452,60 @@
                   <a:srgbClr val="FFFFFF"/>
                 </a:solidFill>
               </a14:hiddenFill>
+            </a:ext>
+          </a:extLst>
+        </p:spPr>
+      </p:pic>
+      <p:pic>
+        <p:nvPicPr>
+          <p:cNvPr id="4099" name="Picture 3"/>
+          <p:cNvPicPr>
+            <a:picLocks noChangeAspect="1" noChangeArrowheads="1"/>
+          </p:cNvPicPr>
+          <p:nvPr/>
+        </p:nvPicPr>
+        <p:blipFill>
+          <a:blip r:embed="rId3">
+            <a:extLst>
+              <a:ext uri="{28A0092B-C50C-407E-A947-70E740481C1C}">
+                <a14:useLocalDpi xmlns:a14="http://schemas.microsoft.com/office/drawing/2010/main" val="0"/>
+              </a:ext>
+            </a:extLst>
+          </a:blip>
+          <a:srcRect/>
+          <a:stretch>
+            <a:fillRect/>
+          </a:stretch>
+        </p:blipFill>
+        <p:spPr bwMode="auto">
+          <a:xfrm>
+            <a:off x="577791" y="2636912"/>
+            <a:ext cx="4600575" cy="2733675"/>
+          </a:xfrm>
+          <a:prstGeom prst="rect">
+            <a:avLst/>
+          </a:prstGeom>
+          <a:noFill/>
+          <a:ln>
+            <a:noFill/>
+          </a:ln>
+          <a:extLst>
+            <a:ext uri="{909E8E84-426E-40DD-AFC4-6F175D3DCCD1}">
+              <a14:hiddenFill xmlns:a14="http://schemas.microsoft.com/office/drawing/2010/main">
+                <a:solidFill>
+                  <a:schemeClr val="accent1"/>
+                </a:solidFill>
+              </a14:hiddenFill>
+            </a:ext>
+            <a:ext uri="{91240B29-F687-4F45-9708-019B960494DF}">
+              <a14:hiddenLine xmlns:a14="http://schemas.microsoft.com/office/drawing/2010/main" w="9525">
+                <a:solidFill>
+                  <a:schemeClr val="tx1"/>
+                </a:solidFill>
+                <a:miter lim="800000"/>
+                <a:headEnd/>
+                <a:tailEnd/>
+              </a14:hiddenLine>
             </a:ext>
           </a:extLst>
         </p:spPr>

</xml_diff>